<commit_message>
Transitions on the final presentation
</commit_message>
<xml_diff>
--- a/OtherStuff/FINAL PRESENTATION/MyTaxiService.pptx
+++ b/OtherStuff/FINAL PRESENTATION/MyTaxiService.pptx
@@ -148,6 +148,22 @@
       </a:defRPr>
     </a:lvl9pPr>
   </p:defaultTextStyle>
+  <p:extLst>
+    <p:ext uri="{EFAFB233-063F-42B5-8137-9DF3F51BA10A}">
+      <p15:sldGuideLst xmlns:p15="http://schemas.microsoft.com/office/powerpoint/2012/main">
+        <p15:guide id="1" orient="horz" pos="1620">
+          <p15:clr>
+            <a:srgbClr val="A4A3A4"/>
+          </p15:clr>
+        </p15:guide>
+        <p15:guide id="2" pos="2880">
+          <p15:clr>
+            <a:srgbClr val="A4A3A4"/>
+          </p15:clr>
+        </p15:guide>
+      </p15:sldGuideLst>
+    </p:ext>
+  </p:extLst>
 </p:presentation>
 </file>
 
@@ -3666,9 +3682,7 @@
             <a:r>
               <a:rPr lang="en-US" sz="2800" b="1" dirty="0" err="1" smtClean="0">
                 <a:solidFill>
-                  <a:schemeClr val="accent2">
-                    <a:lumMod val="75000"/>
-                  </a:schemeClr>
+                  <a:schemeClr val="tx1"/>
                 </a:solidFill>
                 <a:latin typeface="Cambria" panose="02040503050406030204" pitchFamily="18" charset="0"/>
               </a:rPr>
@@ -3677,9 +3691,7 @@
             <a:r>
               <a:rPr lang="en-US" sz="2800" b="1" dirty="0">
                 <a:solidFill>
-                  <a:schemeClr val="accent2">
-                    <a:lumMod val="75000"/>
-                  </a:schemeClr>
+                  <a:schemeClr val="tx1"/>
                 </a:solidFill>
                 <a:latin typeface="Cambria" panose="02040503050406030204" pitchFamily="18" charset="0"/>
               </a:rPr>
@@ -3687,9 +3699,7 @@
             </a:r>
             <a:endParaRPr lang="en-US" sz="2800" dirty="0">
               <a:solidFill>
-                <a:schemeClr val="accent2">
-                  <a:lumMod val="75000"/>
-                </a:schemeClr>
+                <a:schemeClr val="tx1"/>
               </a:solidFill>
               <a:latin typeface="Cambria" panose="02040503050406030204" pitchFamily="18" charset="0"/>
             </a:endParaRPr>
@@ -3726,18 +3736,7 @@
                 </a:solidFill>
                 <a:latin typeface="Cambria" panose="02040503050406030204" pitchFamily="18" charset="0"/>
               </a:rPr>
-              <a:t>. </a:t>
-            </a:r>
-            <a:r>
-              <a:rPr lang="it-IT" sz="1600" i="1" dirty="0">
-                <a:solidFill>
-                  <a:schemeClr val="accent2">
-                    <a:lumMod val="75000"/>
-                  </a:schemeClr>
-                </a:solidFill>
-                <a:latin typeface="Cambria" panose="02040503050406030204" pitchFamily="18" charset="0"/>
-              </a:rPr>
-              <a:t>852358), </a:t>
+              <a:t>. 852358), </a:t>
             </a:r>
             <a:endParaRPr lang="it-IT" sz="1600" i="1" dirty="0" smtClean="0">
               <a:solidFill>
@@ -3847,6 +3846,9 @@
   <p:clrMapOvr>
     <a:masterClrMapping/>
   </p:clrMapOvr>
+  <p:transition spd="med">
+    <p:pull/>
+  </p:transition>
   <p:timing>
     <p:tnLst>
       <p:par>
@@ -7311,6 +7313,14 @@
   <p:clrMapOvr>
     <a:masterClrMapping/>
   </p:clrMapOvr>
+  <mc:AlternateContent xmlns:mc="http://schemas.openxmlformats.org/markup-compatibility/2006">
+    <mc:Choice xmlns:p14="http://schemas.microsoft.com/office/powerpoint/2010/main" Requires="p14">
+      <p:transition p14:dur="0"/>
+    </mc:Choice>
+    <mc:Fallback>
+      <p:transition/>
+    </mc:Fallback>
+  </mc:AlternateContent>
   <p:timing>
     <p:tnLst>
       <p:par>
@@ -7443,6 +7453,13 @@
                     <a:lumMod val="75000"/>
                   </a:schemeClr>
                 </a:solidFill>
+                <a:effectLst>
+                  <a:outerShdw blurRad="38100" dist="38100" dir="2700000" algn="tl">
+                    <a:srgbClr val="000000">
+                      <a:alpha val="43137"/>
+                    </a:srgbClr>
+                  </a:outerShdw>
+                </a:effectLst>
                 <a:latin typeface="Adobe Fangsong Std R" pitchFamily="18" charset="-128"/>
                 <a:ea typeface="Adobe Fangsong Std R" pitchFamily="18" charset="-128"/>
               </a:rPr>
@@ -7454,6 +7471,13 @@
                   <a:lumMod val="75000"/>
                 </a:schemeClr>
               </a:solidFill>
+              <a:effectLst>
+                <a:outerShdw blurRad="38100" dist="38100" dir="2700000" algn="tl">
+                  <a:srgbClr val="000000">
+                    <a:alpha val="43137"/>
+                  </a:srgbClr>
+                </a:outerShdw>
+              </a:effectLst>
               <a:latin typeface="Adobe Fangsong Std R" pitchFamily="18" charset="-128"/>
               <a:ea typeface="Adobe Fangsong Std R" pitchFamily="18" charset="-128"/>
             </a:endParaRPr>
@@ -7470,6 +7494,9 @@
   <p:clrMapOvr>
     <a:masterClrMapping/>
   </p:clrMapOvr>
+  <p:transition spd="slow">
+    <p:cover/>
+  </p:transition>
   <p:timing>
     <p:tnLst>
       <p:par>
@@ -8051,6 +8078,9 @@
   <p:clrMapOvr>
     <a:masterClrMapping/>
   </p:clrMapOvr>
+  <p:transition spd="med">
+    <p:pull/>
+  </p:transition>
   <p:timing>
     <p:tnLst>
       <p:par>
@@ -8684,23 +8714,37 @@
           <a:lstStyle/>
           <a:p>
             <a:r>
-              <a:rPr lang="it-IT" sz="7700" dirty="0" err="1" smtClean="0">
+              <a:rPr lang="it-IT" sz="8000" dirty="0" err="1">
                 <a:solidFill>
                   <a:schemeClr val="accent2">
                     <a:lumMod val="75000"/>
                   </a:schemeClr>
                 </a:solidFill>
+                <a:effectLst>
+                  <a:outerShdw blurRad="38100" dist="38100" dir="2700000" algn="tl">
+                    <a:srgbClr val="000000">
+                      <a:alpha val="43137"/>
+                    </a:srgbClr>
+                  </a:outerShdw>
+                </a:effectLst>
                 <a:latin typeface="Adobe Fangsong Std R" pitchFamily="18" charset="-128"/>
                 <a:ea typeface="Adobe Fangsong Std R" pitchFamily="18" charset="-128"/>
               </a:rPr>
               <a:t>Requirements</a:t>
             </a:r>
-            <a:endParaRPr lang="it-IT" sz="7700" dirty="0">
+            <a:endParaRPr lang="it-IT" sz="8000" dirty="0">
               <a:solidFill>
                 <a:schemeClr val="accent2">
                   <a:lumMod val="75000"/>
                 </a:schemeClr>
               </a:solidFill>
+              <a:effectLst>
+                <a:outerShdw blurRad="38100" dist="38100" dir="2700000" algn="tl">
+                  <a:srgbClr val="000000">
+                    <a:alpha val="43137"/>
+                  </a:srgbClr>
+                </a:outerShdw>
+              </a:effectLst>
               <a:latin typeface="Adobe Fangsong Std R" pitchFamily="18" charset="-128"/>
               <a:ea typeface="Adobe Fangsong Std R" pitchFamily="18" charset="-128"/>
             </a:endParaRPr>
@@ -8717,6 +8761,9 @@
   <p:clrMapOvr>
     <a:masterClrMapping/>
   </p:clrMapOvr>
+  <p:transition spd="med">
+    <p:pull/>
+  </p:transition>
   <p:timing>
     <p:tnLst>
       <p:par>
@@ -14416,6 +14463,14 @@
   <p:clrMapOvr>
     <a:masterClrMapping/>
   </p:clrMapOvr>
+  <mc:AlternateContent xmlns:mc="http://schemas.openxmlformats.org/markup-compatibility/2006">
+    <mc:Choice xmlns:p14="http://schemas.microsoft.com/office/powerpoint/2010/main" Requires="p14">
+      <p:transition p14:dur="0"/>
+    </mc:Choice>
+    <mc:Fallback>
+      <p:transition/>
+    </mc:Fallback>
+  </mc:AlternateContent>
   <p:timing>
     <p:tnLst>
       <p:par>
@@ -14548,6 +14603,13 @@
                     <a:lumMod val="75000"/>
                   </a:schemeClr>
                 </a:solidFill>
+                <a:effectLst>
+                  <a:outerShdw blurRad="38100" dist="38100" dir="2700000" algn="tl">
+                    <a:srgbClr val="000000">
+                      <a:alpha val="43137"/>
+                    </a:srgbClr>
+                  </a:outerShdw>
+                </a:effectLst>
                 <a:latin typeface="Adobe Fangsong Std R" pitchFamily="18" charset="-128"/>
                 <a:ea typeface="Adobe Fangsong Std R" pitchFamily="18" charset="-128"/>
               </a:rPr>
@@ -14559,6 +14621,13 @@
                   <a:lumMod val="75000"/>
                 </a:schemeClr>
               </a:solidFill>
+              <a:effectLst>
+                <a:outerShdw blurRad="38100" dist="38100" dir="2700000" algn="tl">
+                  <a:srgbClr val="000000">
+                    <a:alpha val="43137"/>
+                  </a:srgbClr>
+                </a:outerShdw>
+              </a:effectLst>
               <a:latin typeface="Adobe Fangsong Std R" pitchFamily="18" charset="-128"/>
               <a:ea typeface="Adobe Fangsong Std R" pitchFamily="18" charset="-128"/>
             </a:endParaRPr>
@@ -14575,6 +14644,9 @@
   <p:clrMapOvr>
     <a:masterClrMapping/>
   </p:clrMapOvr>
+  <p:transition spd="slow">
+    <p:cover/>
+  </p:transition>
   <p:timing>
     <p:tnLst>
       <p:par>
@@ -14624,7 +14696,7 @@
                     <a:lumMod val="75000"/>
                   </a:schemeClr>
                 </a:solidFill>
-                <a:latin typeface="Georgia" panose="02040502050405020303" pitchFamily="18" charset="0"/>
+                <a:latin typeface="Cambria" panose="02040503050406030204" pitchFamily="18" charset="0"/>
               </a:rPr>
               <a:t>Domain </a:t>
             </a:r>
@@ -14635,7 +14707,7 @@
                     <a:lumMod val="75000"/>
                   </a:schemeClr>
                 </a:solidFill>
-                <a:latin typeface="Georgia" panose="02040502050405020303" pitchFamily="18" charset="0"/>
+                <a:latin typeface="Cambria" panose="02040503050406030204" pitchFamily="18" charset="0"/>
               </a:rPr>
               <a:t>Assumptions</a:t>
             </a:r>
@@ -14645,7 +14717,7 @@
                   <a:lumMod val="75000"/>
                 </a:schemeClr>
               </a:solidFill>
-              <a:latin typeface="Georgia" panose="02040502050405020303" pitchFamily="18" charset="0"/>
+              <a:latin typeface="Cambria" panose="02040503050406030204" pitchFamily="18" charset="0"/>
             </a:endParaRPr>
           </a:p>
         </p:txBody>
@@ -14737,6 +14809,9 @@
   <p:clrMapOvr>
     <a:masterClrMapping/>
   </p:clrMapOvr>
+  <p:transition spd="med">
+    <p:pull/>
+  </p:transition>
   <p:timing>
     <p:tnLst>
       <p:par>
@@ -15120,9 +15195,6 @@
               </a:rPr>
               <a:t>Each subsystem can be tested separately.</a:t>
             </a:r>
-            <a:endParaRPr lang="en-US" dirty="0">
-              <a:latin typeface="Cambria" panose="02040503050406030204" pitchFamily="18" charset="0"/>
-            </a:endParaRPr>
           </a:p>
         </p:txBody>
       </p:sp>
@@ -15136,6 +15208,9 @@
   <p:clrMapOvr>
     <a:masterClrMapping/>
   </p:clrMapOvr>
+  <p:transition spd="med">
+    <p:pull/>
+  </p:transition>
   <p:timing>
     <p:tnLst>
       <p:par>
@@ -16152,17 +16227,8 @@
               <a:rPr lang="en-US" dirty="0">
                 <a:latin typeface="Cambria" panose="02040503050406030204" pitchFamily="18" charset="0"/>
               </a:rPr>
-              <a:t> </a:t>
-            </a:r>
-            <a:r>
-              <a:rPr lang="en-US" dirty="0">
-                <a:latin typeface="Cambria" panose="02040503050406030204" pitchFamily="18" charset="0"/>
-              </a:rPr>
-              <a:t>are tested independently.</a:t>
-            </a:r>
-            <a:endParaRPr lang="en-US" dirty="0">
-              <a:latin typeface="Cambria" panose="02040503050406030204" pitchFamily="18" charset="0"/>
-            </a:endParaRPr>
+              <a:t> are tested independently.</a:t>
+            </a:r>
           </a:p>
         </p:txBody>
       </p:sp>
@@ -16361,12 +16427,6 @@
               </a:rPr>
               <a:t>Integration</a:t>
             </a:r>
-            <a:endParaRPr lang="en-US" sz="1500" dirty="0">
-              <a:solidFill>
-                <a:srgbClr val="FF0000"/>
-              </a:solidFill>
-              <a:latin typeface="Cambria" panose="02040503050406030204" pitchFamily="18" charset="0"/>
-            </a:endParaRPr>
           </a:p>
         </p:txBody>
       </p:sp>
@@ -16812,9 +16872,6 @@
               </a:rPr>
               <a:t>User Manager.</a:t>
             </a:r>
-            <a:endParaRPr lang="en-US" i="1" dirty="0">
-              <a:latin typeface="Cambria" panose="02040503050406030204" pitchFamily="18" charset="0"/>
-            </a:endParaRPr>
           </a:p>
         </p:txBody>
       </p:sp>
@@ -17051,12 +17108,6 @@
               </a:rPr>
               <a:t>Integration</a:t>
             </a:r>
-            <a:endParaRPr lang="en-US" sz="1500" dirty="0">
-              <a:solidFill>
-                <a:srgbClr val="FF0000"/>
-              </a:solidFill>
-              <a:latin typeface="Cambria" panose="02040503050406030204" pitchFamily="18" charset="0"/>
-            </a:endParaRPr>
           </a:p>
         </p:txBody>
       </p:sp>
@@ -17519,9 +17570,6 @@
               </a:rPr>
               <a:t>.</a:t>
             </a:r>
-            <a:endParaRPr lang="en-US" i="1" dirty="0">
-              <a:latin typeface="Cambria" panose="02040503050406030204" pitchFamily="18" charset="0"/>
-            </a:endParaRPr>
           </a:p>
         </p:txBody>
       </p:sp>
@@ -17668,12 +17716,6 @@
               </a:rPr>
               <a:t>Integration</a:t>
             </a:r>
-            <a:endParaRPr lang="en-US" sz="1500" dirty="0">
-              <a:solidFill>
-                <a:srgbClr val="FF0000"/>
-              </a:solidFill>
-              <a:latin typeface="Cambria" panose="02040503050406030204" pitchFamily="18" charset="0"/>
-            </a:endParaRPr>
           </a:p>
         </p:txBody>
       </p:sp>
@@ -18012,9 +18054,6 @@
               </a:rPr>
               <a:t>Application Server.</a:t>
             </a:r>
-            <a:endParaRPr lang="en-US" i="1" dirty="0">
-              <a:latin typeface="Cambria" panose="02040503050406030204" pitchFamily="18" charset="0"/>
-            </a:endParaRPr>
           </a:p>
         </p:txBody>
       </p:sp>
@@ -18049,12 +18088,6 @@
               </a:rPr>
               <a:t>This was the last component!</a:t>
             </a:r>
-            <a:endParaRPr lang="en-US" sz="1500" dirty="0">
-              <a:solidFill>
-                <a:srgbClr val="FF0000"/>
-              </a:solidFill>
-              <a:latin typeface="Cambria" panose="02040503050406030204" pitchFamily="18" charset="0"/>
-            </a:endParaRPr>
           </a:p>
         </p:txBody>
       </p:sp>
@@ -18784,9 +18817,6 @@
               </a:rPr>
               <a:t>.</a:t>
             </a:r>
-            <a:endParaRPr lang="en-US" sz="1700" dirty="0">
-              <a:latin typeface="Cambria" panose="02040503050406030204" pitchFamily="18" charset="0"/>
-            </a:endParaRPr>
           </a:p>
         </p:txBody>
       </p:sp>
@@ -19268,6 +19298,13 @@
                     <a:lumMod val="75000"/>
                   </a:schemeClr>
                 </a:solidFill>
+                <a:effectLst>
+                  <a:outerShdw blurRad="38100" dist="38100" dir="2700000" algn="tl">
+                    <a:srgbClr val="000000">
+                      <a:alpha val="43137"/>
+                    </a:srgbClr>
+                  </a:outerShdw>
+                </a:effectLst>
                 <a:latin typeface="Adobe Fangsong Std R" pitchFamily="18" charset="-128"/>
                 <a:ea typeface="Adobe Fangsong Std R" pitchFamily="18" charset="-128"/>
               </a:rPr>
@@ -19280,6 +19317,13 @@
                     <a:lumMod val="75000"/>
                   </a:schemeClr>
                 </a:solidFill>
+                <a:effectLst>
+                  <a:outerShdw blurRad="38100" dist="38100" dir="2700000" algn="tl">
+                    <a:srgbClr val="000000">
+                      <a:alpha val="43137"/>
+                    </a:srgbClr>
+                  </a:outerShdw>
+                </a:effectLst>
                 <a:latin typeface="Adobe Fangsong Std R" pitchFamily="18" charset="-128"/>
                 <a:ea typeface="Adobe Fangsong Std R" pitchFamily="18" charset="-128"/>
               </a:rPr>
@@ -19292,6 +19336,13 @@
                     <a:lumMod val="75000"/>
                   </a:schemeClr>
                 </a:solidFill>
+                <a:effectLst>
+                  <a:outerShdw blurRad="38100" dist="38100" dir="2700000" algn="tl">
+                    <a:srgbClr val="000000">
+                      <a:alpha val="43137"/>
+                    </a:srgbClr>
+                  </a:outerShdw>
+                </a:effectLst>
                 <a:latin typeface="Adobe Fangsong Std R" pitchFamily="18" charset="-128"/>
                 <a:ea typeface="Adobe Fangsong Std R" pitchFamily="18" charset="-128"/>
               </a:rPr>
@@ -19303,6 +19354,13 @@
                   <a:lumMod val="75000"/>
                 </a:schemeClr>
               </a:solidFill>
+              <a:effectLst>
+                <a:outerShdw blurRad="38100" dist="38100" dir="2700000" algn="tl">
+                  <a:srgbClr val="000000">
+                    <a:alpha val="43137"/>
+                  </a:srgbClr>
+                </a:outerShdw>
+              </a:effectLst>
               <a:latin typeface="Adobe Fangsong Std R" pitchFamily="18" charset="-128"/>
               <a:ea typeface="Adobe Fangsong Std R" pitchFamily="18" charset="-128"/>
             </a:endParaRPr>
@@ -19319,6 +19377,9 @@
   <p:clrMapOvr>
     <a:masterClrMapping/>
   </p:clrMapOvr>
+  <p:transition spd="slow">
+    <p:cover/>
+  </p:transition>
   <p:timing>
     <p:tnLst>
       <p:par>
@@ -19485,13 +19546,7 @@
               <a:rPr lang="en-US" sz="1500" i="1" dirty="0">
                 <a:latin typeface="Cambria" panose="02040503050406030204" pitchFamily="18" charset="0"/>
               </a:rPr>
-              <a:t>Internal / External logical </a:t>
-            </a:r>
-            <a:r>
-              <a:rPr lang="en-US" sz="1500" i="1" dirty="0">
-                <a:latin typeface="Cambria" panose="02040503050406030204" pitchFamily="18" charset="0"/>
-              </a:rPr>
-              <a:t>files</a:t>
+              <a:t>Internal / External logical files</a:t>
             </a:r>
           </a:p>
           <a:p>
@@ -19592,9 +19647,6 @@
               </a:rPr>
               <a:t>Example: Rides, City Zones</a:t>
             </a:r>
-            <a:endParaRPr lang="en-US" sz="1500" dirty="0">
-              <a:latin typeface="Cambria" panose="02040503050406030204" pitchFamily="18" charset="0"/>
-            </a:endParaRPr>
           </a:p>
           <a:p>
             <a:endParaRPr lang="en-US" sz="1500" dirty="0">
@@ -19630,19 +19682,7 @@
               <a:rPr lang="en-US" sz="1500" i="1" dirty="0">
                 <a:latin typeface="Cambria" panose="02040503050406030204" pitchFamily="18" charset="0"/>
               </a:rPr>
-              <a:t>External input / output</a:t>
-            </a:r>
-            <a:r>
-              <a:rPr lang="en-US" sz="1500" i="1" dirty="0">
-                <a:latin typeface="Cambria" panose="02040503050406030204" pitchFamily="18" charset="0"/>
-              </a:rPr>
-              <a:t> </a:t>
-            </a:r>
-            <a:r>
-              <a:rPr lang="en-US" sz="1500" i="1" dirty="0">
-                <a:latin typeface="Cambria" panose="02040503050406030204" pitchFamily="18" charset="0"/>
-              </a:rPr>
-              <a:t>/ inquiries</a:t>
+              <a:t>External input / output / inquiries</a:t>
             </a:r>
           </a:p>
           <a:p>
@@ -19779,6 +19819,9 @@
   <p:clrMapOvr>
     <a:masterClrMapping/>
   </p:clrMapOvr>
+  <p:transition spd="med">
+    <p:pull/>
+  </p:transition>
   <p:timing>
     <p:tnLst>
       <p:par>
@@ -20962,13 +21005,7 @@
               <a:rPr lang="en-US" dirty="0" smtClean="0">
                 <a:latin typeface="Cambria" panose="02040503050406030204" pitchFamily="18" charset="0"/>
               </a:rPr>
-              <a:t> </a:t>
-            </a:r>
-            <a:r>
-              <a:rPr lang="en-US" dirty="0" smtClean="0">
-                <a:latin typeface="Cambria" panose="02040503050406030204" pitchFamily="18" charset="0"/>
-              </a:rPr>
-              <a:t> A taxi driver account cannot be used as a customer account, and vice versa. This means that if a taxi driver wants to access the customer’s services, he will need to create a customer account. </a:t>
+              <a:t>  A taxi driver account cannot be used as a customer account, and vice versa. This means that if a taxi driver wants to access the customer’s services, he will need to create a customer account. </a:t>
             </a:r>
           </a:p>
           <a:p>
@@ -21274,14 +21311,6 @@
               </a:rPr>
               <a:t>Function Points</a:t>
             </a:r>
-            <a:endParaRPr lang="en-US" sz="3200" dirty="0">
-              <a:solidFill>
-                <a:schemeClr val="accent2">
-                  <a:lumMod val="75000"/>
-                </a:schemeClr>
-              </a:solidFill>
-              <a:latin typeface="Cambria" panose="02040503050406030204" pitchFamily="18" charset="0"/>
-            </a:endParaRPr>
           </a:p>
         </p:txBody>
       </p:sp>
@@ -21377,13 +21406,7 @@
                   <a:rPr lang="en-US" sz="1500" dirty="0">
                     <a:latin typeface="Cambria" panose="02040503050406030204" pitchFamily="18" charset="0"/>
                   </a:rPr>
-                  <a:t>) </a:t>
-                </a:r>
-                <a:r>
-                  <a:rPr lang="en-US" sz="1500" dirty="0">
-                    <a:latin typeface="Cambria" panose="02040503050406030204" pitchFamily="18" charset="0"/>
-                  </a:rPr>
-                  <a:t>are:</a:t>
+                  <a:t>) are:</a:t>
                 </a:r>
               </a:p>
               <a:p>
@@ -21836,8 +21859,8 @@
           </a:p>
         </p:txBody>
       </p:sp>
-      <mc:AlternateContent xmlns:mc="http://schemas.openxmlformats.org/markup-compatibility/2006">
-        <mc:Choice xmlns:a14="http://schemas.microsoft.com/office/drawing/2010/main" Requires="a14">
+      <mc:AlternateContent xmlns:mc="http://schemas.openxmlformats.org/markup-compatibility/2006" xmlns:a14="http://schemas.microsoft.com/office/drawing/2010/main">
+        <mc:Choice Requires="a14">
           <p:sp>
             <p:nvSpPr>
               <p:cNvPr id="3" name="Rettangolo 2"/>
@@ -21956,7 +21979,7 @@
                         <m:sSupPr>
                           <m:ctrlPr>
                             <a:rPr lang="en-US" sz="1500" i="1">
-                              <a:latin typeface="Cambria Math"/>
+                              <a:latin typeface="Cambria Math" panose="02040503050406030204" pitchFamily="18" charset="0"/>
                             </a:rPr>
                           </m:ctrlPr>
                         </m:sSupPr>
@@ -22044,7 +22067,7 @@
                         <m:sSupPr>
                           <m:ctrlPr>
                             <a:rPr lang="en-US" sz="1500" i="1">
-                              <a:latin typeface="Cambria Math"/>
+                              <a:latin typeface="Cambria Math" panose="02040503050406030204" pitchFamily="18" charset="0"/>
                             </a:rPr>
                           </m:ctrlPr>
                         </m:sSupPr>
@@ -22109,7 +22132,7 @@
                         <m:sSubPr>
                           <m:ctrlPr>
                             <a:rPr lang="en-US" sz="1500" i="1">
-                              <a:latin typeface="Cambria Math"/>
+                              <a:latin typeface="Cambria Math" panose="02040503050406030204" pitchFamily="18" charset="0"/>
                             </a:rPr>
                           </m:ctrlPr>
                         </m:sSubPr>
@@ -22140,7 +22163,7 @@
                         <m:fPr>
                           <m:ctrlPr>
                             <a:rPr lang="en-US" sz="1500" i="1">
-                              <a:latin typeface="Cambria Math"/>
+                              <a:latin typeface="Cambria Math" panose="02040503050406030204" pitchFamily="18" charset="0"/>
                             </a:rPr>
                           </m:ctrlPr>
                         </m:fPr>
@@ -22200,7 +22223,7 @@
             </p:txBody>
           </p:sp>
         </mc:Choice>
-        <mc:Fallback>
+        <mc:Fallback xmlns="">
           <p:sp>
             <p:nvSpPr>
               <p:cNvPr id="3" name="Rettangolo 2"/>
@@ -22249,6 +22272,14 @@
   <p:clrMapOvr>
     <a:masterClrMapping/>
   </p:clrMapOvr>
+  <mc:AlternateContent xmlns:mc="http://schemas.openxmlformats.org/markup-compatibility/2006">
+    <mc:Choice xmlns:p14="http://schemas.microsoft.com/office/powerpoint/2010/main" Requires="p14">
+      <p:transition p14:dur="0"/>
+    </mc:Choice>
+    <mc:Fallback>
+      <p:transition/>
+    </mc:Fallback>
+  </mc:AlternateContent>
   <p:timing>
     <p:tnLst>
       <p:par>
@@ -22757,6 +22788,9 @@
   <p:clrMapOvr>
     <a:masterClrMapping/>
   </p:clrMapOvr>
+  <p:transition spd="slow">
+    <p:cover/>
+  </p:transition>
   <p:timing>
     <p:tnLst>
       <p:par>
@@ -22892,13 +22926,7 @@
               <a:rPr lang="en-US" dirty="0" smtClean="0">
                 <a:latin typeface="Cambria" panose="02040503050406030204" pitchFamily="18" charset="0"/>
               </a:rPr>
-              <a:t> </a:t>
-            </a:r>
-            <a:r>
-              <a:rPr lang="en-US" dirty="0" smtClean="0">
-                <a:latin typeface="Cambria" panose="02040503050406030204" pitchFamily="18" charset="0"/>
-              </a:rPr>
-              <a:t>The web and mobile registration is intended for customers only. Taxi drivers’ account are created by an administrator when they are hired by the taxi company. Taxi drivers will then receive their username and temporary password, which they will be able to change once logged in the application. </a:t>
+              <a:t> The web and mobile registration is intended for customers only. Taxi drivers’ account are created by an administrator when they are hired by the taxi company. Taxi drivers will then receive their username and temporary password, which they will be able to change once logged in the application. </a:t>
             </a:r>
           </a:p>
           <a:p>

</xml_diff>

<commit_message>
Final Presentation small update
</commit_message>
<xml_diff>
--- a/OtherStuff/FINAL PRESENTATION/MyTaxiService.pptx
+++ b/OtherStuff/FINAL PRESENTATION/MyTaxiService.pptx
@@ -3888,8 +3888,8 @@
         </p:nvSpPr>
         <p:spPr>
           <a:xfrm>
-            <a:off x="1652249" y="2355726"/>
-            <a:ext cx="5915025" cy="2054852"/>
+            <a:off x="899592" y="2355726"/>
+            <a:ext cx="7200799" cy="2448272"/>
           </a:xfrm>
         </p:spPr>
         <p:txBody>
@@ -3898,22 +3898,68 @@
           </a:bodyPr>
           <a:lstStyle/>
           <a:p>
+            <a:pPr>
+              <a:lnSpc>
+                <a:spcPct val="120000"/>
+              </a:lnSpc>
+              <a:spcBef>
+                <a:spcPts val="0"/>
+              </a:spcBef>
+              <a:spcAft>
+                <a:spcPts val="600"/>
+              </a:spcAft>
+            </a:pPr>
             <a:r>
               <a:rPr lang="en-US" dirty="0">
                 <a:latin typeface="Cambria" panose="02040503050406030204" pitchFamily="18" charset="0"/>
               </a:rPr>
-              <a:t>[R1] The system should send updates through email and/or in-app notification, as specified by the customer.</a:t>
+              <a:t>[</a:t>
+            </a:r>
+            <a:r>
+              <a:rPr lang="en-US" b="1" dirty="0">
+                <a:latin typeface="Cambria" panose="02040503050406030204" pitchFamily="18" charset="0"/>
+              </a:rPr>
+              <a:t>R1</a:t>
+            </a:r>
+            <a:r>
+              <a:rPr lang="en-US" dirty="0">
+                <a:latin typeface="Cambria" panose="02040503050406030204" pitchFamily="18" charset="0"/>
+              </a:rPr>
+              <a:t>] The system should send updates through email and/or in-app notification, as specified by the customer.</a:t>
             </a:r>
             <a:endParaRPr lang="it-IT" dirty="0">
               <a:latin typeface="Cambria" panose="02040503050406030204" pitchFamily="18" charset="0"/>
             </a:endParaRPr>
           </a:p>
           <a:p>
+            <a:pPr>
+              <a:lnSpc>
+                <a:spcPct val="120000"/>
+              </a:lnSpc>
+              <a:spcBef>
+                <a:spcPts val="0"/>
+              </a:spcBef>
+              <a:spcAft>
+                <a:spcPts val="600"/>
+              </a:spcAft>
+            </a:pPr>
             <a:r>
               <a:rPr lang="en-US" dirty="0">
                 <a:latin typeface="Cambria" panose="02040503050406030204" pitchFamily="18" charset="0"/>
               </a:rPr>
-              <a:t>[R2] Absence of taxis available, reservations overlaps, taxi average waiting time and taxi assigned to customers are events that must be notified to the customer.</a:t>
+              <a:t>[</a:t>
+            </a:r>
+            <a:r>
+              <a:rPr lang="en-US" b="1" dirty="0">
+                <a:latin typeface="Cambria" panose="02040503050406030204" pitchFamily="18" charset="0"/>
+              </a:rPr>
+              <a:t>R2</a:t>
+            </a:r>
+            <a:r>
+              <a:rPr lang="en-US" dirty="0">
+                <a:latin typeface="Cambria" panose="02040503050406030204" pitchFamily="18" charset="0"/>
+              </a:rPr>
+              <a:t>] Absence of taxis available, reservations overlaps, taxi average waiting time and taxi assigned to customers are events that must be notified to the customer.</a:t>
             </a:r>
             <a:endParaRPr lang="it-IT" dirty="0">
               <a:latin typeface="Cambria" panose="02040503050406030204" pitchFamily="18" charset="0"/>
@@ -4217,8 +4263,8 @@
         </p:nvSpPr>
         <p:spPr>
           <a:xfrm>
-            <a:off x="1593058" y="2571750"/>
-            <a:ext cx="5915025" cy="2201048"/>
+            <a:off x="1187624" y="2571750"/>
+            <a:ext cx="6624736" cy="2448272"/>
           </a:xfrm>
         </p:spPr>
         <p:txBody>
@@ -4227,44 +4273,124 @@
           </a:bodyPr>
           <a:lstStyle/>
           <a:p>
+            <a:pPr>
+              <a:lnSpc>
+                <a:spcPct val="120000"/>
+              </a:lnSpc>
+              <a:spcAft>
+                <a:spcPts val="400"/>
+              </a:spcAft>
+            </a:pPr>
             <a:r>
               <a:rPr lang="en-US" dirty="0">
                 <a:latin typeface="Cambria" panose="02040503050406030204" pitchFamily="18" charset="0"/>
               </a:rPr>
-              <a:t>[R1] Customers must leave a valid phone number in order to complete the registration phase.</a:t>
+              <a:t>[</a:t>
+            </a:r>
+            <a:r>
+              <a:rPr lang="en-US" b="1" dirty="0">
+                <a:latin typeface="Cambria" panose="02040503050406030204" pitchFamily="18" charset="0"/>
+              </a:rPr>
+              <a:t>R1</a:t>
+            </a:r>
+            <a:r>
+              <a:rPr lang="en-US" dirty="0">
+                <a:latin typeface="Cambria" panose="02040503050406030204" pitchFamily="18" charset="0"/>
+              </a:rPr>
+              <a:t>] Customers must leave a valid phone number in order to complete the registration phase.</a:t>
             </a:r>
             <a:endParaRPr lang="it-IT" dirty="0">
               <a:latin typeface="Cambria" panose="02040503050406030204" pitchFamily="18" charset="0"/>
             </a:endParaRPr>
           </a:p>
           <a:p>
+            <a:pPr>
+              <a:lnSpc>
+                <a:spcPct val="120000"/>
+              </a:lnSpc>
+              <a:spcAft>
+                <a:spcPts val="400"/>
+              </a:spcAft>
+            </a:pPr>
             <a:r>
               <a:rPr lang="en-US" dirty="0">
                 <a:latin typeface="Cambria" panose="02040503050406030204" pitchFamily="18" charset="0"/>
               </a:rPr>
-              <a:t>[R2] Taxi drivers must be able to access to the customer’s phone number when the system has paired them.</a:t>
+              <a:t>[</a:t>
+            </a:r>
+            <a:r>
+              <a:rPr lang="en-US" b="1" dirty="0">
+                <a:latin typeface="Cambria" panose="02040503050406030204" pitchFamily="18" charset="0"/>
+              </a:rPr>
+              <a:t>R2</a:t>
+            </a:r>
+            <a:r>
+              <a:rPr lang="en-US" dirty="0">
+                <a:latin typeface="Cambria" panose="02040503050406030204" pitchFamily="18" charset="0"/>
+              </a:rPr>
+              <a:t>] Taxi drivers must be able to access to the customer’s phone number when the system has paired them.</a:t>
             </a:r>
             <a:endParaRPr lang="it-IT" dirty="0">
               <a:latin typeface="Cambria" panose="02040503050406030204" pitchFamily="18" charset="0"/>
             </a:endParaRPr>
           </a:p>
           <a:p>
+            <a:pPr>
+              <a:lnSpc>
+                <a:spcPct val="120000"/>
+              </a:lnSpc>
+              <a:spcAft>
+                <a:spcPts val="400"/>
+              </a:spcAft>
+            </a:pPr>
             <a:r>
               <a:rPr lang="en-US" dirty="0">
                 <a:latin typeface="Cambria" panose="02040503050406030204" pitchFamily="18" charset="0"/>
               </a:rPr>
-              <a:t>[R3] Customers must receive the taxi drivers’ contact number after the system has paired them.</a:t>
+              <a:t>[</a:t>
+            </a:r>
+            <a:r>
+              <a:rPr lang="en-US" b="1" dirty="0">
+                <a:latin typeface="Cambria" panose="02040503050406030204" pitchFamily="18" charset="0"/>
+              </a:rPr>
+              <a:t>R3</a:t>
+            </a:r>
+            <a:r>
+              <a:rPr lang="en-US" dirty="0">
+                <a:latin typeface="Cambria" panose="02040503050406030204" pitchFamily="18" charset="0"/>
+              </a:rPr>
+              <a:t>] Customers must receive the taxi drivers’ contact number after the system has paired them.</a:t>
             </a:r>
             <a:endParaRPr lang="it-IT" dirty="0">
               <a:latin typeface="Cambria" panose="02040503050406030204" pitchFamily="18" charset="0"/>
             </a:endParaRPr>
           </a:p>
           <a:p>
+            <a:pPr>
+              <a:lnSpc>
+                <a:spcPct val="120000"/>
+              </a:lnSpc>
+              <a:spcAft>
+                <a:spcPts val="400"/>
+              </a:spcAft>
+            </a:pPr>
             <a:r>
               <a:rPr lang="en-US" dirty="0">
                 <a:latin typeface="Cambria" panose="02040503050406030204" pitchFamily="18" charset="0"/>
               </a:rPr>
-              <a:t>[R4] Customers must receive the taxi code in order to be able to recognize its driver.</a:t>
+              <a:t>[</a:t>
+            </a:r>
+            <a:r>
+              <a:rPr lang="en-US" b="1" dirty="0">
+                <a:latin typeface="Cambria" panose="02040503050406030204" pitchFamily="18" charset="0"/>
+              </a:rPr>
+              <a:t>R4</a:t>
+            </a:r>
+            <a:r>
+              <a:rPr lang="en-US" dirty="0">
+                <a:latin typeface="Cambria" panose="02040503050406030204" pitchFamily="18" charset="0"/>
+              </a:rPr>
+              <a:t>] Customers must receive the taxi code in order to be able to recognize its driver.</a:t>
             </a:r>
             <a:endParaRPr lang="it-IT" dirty="0">
               <a:latin typeface="Cambria" panose="02040503050406030204" pitchFamily="18" charset="0"/>
@@ -4704,7 +4830,19 @@
               <a:rPr lang="en-US" sz="2400" dirty="0">
                 <a:latin typeface="Cambria" panose="02040503050406030204" pitchFamily="18" charset="0"/>
               </a:rPr>
-              <a:t>[R1] Customers can </a:t>
+              <a:t>[</a:t>
+            </a:r>
+            <a:r>
+              <a:rPr lang="en-US" sz="2400" b="1" dirty="0">
+                <a:latin typeface="Cambria" panose="02040503050406030204" pitchFamily="18" charset="0"/>
+              </a:rPr>
+              <a:t>R1</a:t>
+            </a:r>
+            <a:r>
+              <a:rPr lang="en-US" sz="2400" dirty="0">
+                <a:latin typeface="Cambria" panose="02040503050406030204" pitchFamily="18" charset="0"/>
+              </a:rPr>
+              <a:t>] Customers can </a:t>
             </a:r>
             <a:r>
               <a:rPr lang="en-US" sz="2400" dirty="0" smtClean="0">
@@ -5724,7 +5862,7 @@
         <p:spPr>
           <a:xfrm>
             <a:off x="5061444" y="1699112"/>
-            <a:ext cx="2596661" cy="2406428"/>
+            <a:ext cx="2596661" cy="2685351"/>
           </a:xfrm>
           <a:prstGeom prst="rect">
             <a:avLst/>
@@ -5738,6 +5876,9 @@
           <a:lstStyle/>
           <a:p>
             <a:pPr marL="160731" indent="-160731">
+              <a:spcAft>
+                <a:spcPts val="600"/>
+              </a:spcAft>
               <a:buFont typeface="Arial" panose="020B0604020202020204" pitchFamily="34" charset="0"/>
               <a:buChar char="•"/>
             </a:pPr>
@@ -5813,6 +5954,9 @@
           </a:p>
           <a:p>
             <a:pPr marL="160731" indent="-160731">
+              <a:spcAft>
+                <a:spcPts val="600"/>
+              </a:spcAft>
               <a:buFont typeface="Arial" panose="020B0604020202020204" pitchFamily="34" charset="0"/>
               <a:buChar char="•"/>
             </a:pPr>
@@ -5831,6 +5975,9 @@
           </a:p>
           <a:p>
             <a:pPr marL="160731" indent="-160731">
+              <a:spcAft>
+                <a:spcPts val="600"/>
+              </a:spcAft>
               <a:buFont typeface="Arial" panose="020B0604020202020204" pitchFamily="34" charset="0"/>
               <a:buChar char="•"/>
             </a:pPr>
@@ -5849,6 +5996,9 @@
           </a:p>
           <a:p>
             <a:pPr marL="160731" indent="-160731">
+              <a:spcAft>
+                <a:spcPts val="600"/>
+              </a:spcAft>
               <a:buFont typeface="Arial" panose="020B0604020202020204" pitchFamily="34" charset="0"/>
               <a:buChar char="•"/>
             </a:pPr>
@@ -5870,6 +6020,9 @@
           </a:p>
           <a:p>
             <a:pPr marL="160731" indent="-160731">
+              <a:spcAft>
+                <a:spcPts val="600"/>
+              </a:spcAft>
               <a:buFont typeface="Arial" panose="020B0604020202020204" pitchFamily="34" charset="0"/>
               <a:buChar char="•"/>
             </a:pPr>
@@ -6518,7 +6671,7 @@
         <p:spPr>
           <a:xfrm>
             <a:off x="5139511" y="1499509"/>
-            <a:ext cx="2536422" cy="3577903"/>
+            <a:ext cx="2536422" cy="3834383"/>
           </a:xfrm>
           <a:prstGeom prst="rect">
             <a:avLst/>
@@ -6532,6 +6685,9 @@
           <a:lstStyle/>
           <a:p>
             <a:pPr marL="160731" indent="-160731">
+              <a:spcAft>
+                <a:spcPts val="400"/>
+              </a:spcAft>
               <a:buFont typeface="Arial" panose="020B0604020202020204" pitchFamily="34" charset="0"/>
               <a:buChar char="•"/>
             </a:pPr>
@@ -6609,14 +6765,16 @@
                 <a:ea typeface="Calibri" panose="020F0502020204030204" pitchFamily="34" charset="0"/>
                 <a:cs typeface="Arial" panose="020B0604020202020204" pitchFamily="34" charset="0"/>
               </a:rPr>
-              <a:t>world.</a:t>
-            </a:r>
-          </a:p>
-          <a:p>
-            <a:pPr marL="160731" indent="-160731">
-              <a:buFont typeface="Arial" panose="020B0604020202020204" pitchFamily="34" charset="0"/>
-              <a:buChar char="•"/>
-            </a:pPr>
+              <a:t>world</a:t>
+            </a:r>
+            <a:r>
+              <a:rPr lang="en-US" sz="900" dirty="0" smtClean="0">
+                <a:latin typeface="Georgia" panose="02040502050405020303" pitchFamily="18" charset="0"/>
+                <a:ea typeface="Calibri" panose="020F0502020204030204" pitchFamily="34" charset="0"/>
+                <a:cs typeface="Arial" panose="020B0604020202020204" pitchFamily="34" charset="0"/>
+              </a:rPr>
+              <a:t>.</a:t>
+            </a:r>
             <a:endParaRPr lang="en-US" sz="900" dirty="0">
               <a:latin typeface="Georgia" panose="02040502050405020303" pitchFamily="18" charset="0"/>
               <a:ea typeface="Calibri" panose="020F0502020204030204" pitchFamily="34" charset="0"/>
@@ -6625,6 +6783,9 @@
           </a:p>
           <a:p>
             <a:pPr marL="160731" indent="-160731">
+              <a:spcAft>
+                <a:spcPts val="400"/>
+              </a:spcAft>
               <a:buFont typeface="Arial" panose="020B0604020202020204" pitchFamily="34" charset="0"/>
               <a:buChar char="•"/>
             </a:pPr>
@@ -6646,6 +6807,9 @@
           </a:p>
           <a:p>
             <a:pPr marL="160731" indent="-160731">
+              <a:spcAft>
+                <a:spcPts val="400"/>
+              </a:spcAft>
               <a:buFont typeface="Arial" panose="020B0604020202020204" pitchFamily="34" charset="0"/>
               <a:buChar char="•"/>
             </a:pPr>
@@ -6664,6 +6828,9 @@
           </a:p>
           <a:p>
             <a:pPr marL="160731" indent="-160731">
+              <a:spcAft>
+                <a:spcPts val="400"/>
+              </a:spcAft>
               <a:buFont typeface="Arial" panose="020B0604020202020204" pitchFamily="34" charset="0"/>
               <a:buChar char="•"/>
             </a:pPr>
@@ -6682,6 +6849,9 @@
           </a:p>
           <a:p>
             <a:pPr marL="160731" indent="-160731">
+              <a:spcAft>
+                <a:spcPts val="400"/>
+              </a:spcAft>
               <a:buFont typeface="Arial" panose="020B0604020202020204" pitchFamily="34" charset="0"/>
               <a:buChar char="•"/>
             </a:pPr>
@@ -6958,7 +7128,7 @@
                                         <p:tgtEl>
                                           <p:spTgt spid="5">
                                             <p:txEl>
-                                              <p:pRg st="2" end="2"/>
+                                              <p:pRg st="1" end="1"/>
                                             </p:txEl>
                                           </p:spTgt>
                                         </p:tgtEl>
@@ -6976,7 +7146,7 @@
                                         <p:tgtEl>
                                           <p:spTgt spid="5">
                                             <p:txEl>
-                                              <p:pRg st="2" end="2"/>
+                                              <p:pRg st="1" end="1"/>
                                             </p:txEl>
                                           </p:spTgt>
                                         </p:tgtEl>
@@ -7019,7 +7189,7 @@
                                         <p:tgtEl>
                                           <p:spTgt spid="5">
                                             <p:txEl>
-                                              <p:pRg st="3" end="3"/>
+                                              <p:pRg st="2" end="2"/>
                                             </p:txEl>
                                           </p:spTgt>
                                         </p:tgtEl>
@@ -7037,7 +7207,7 @@
                                         <p:tgtEl>
                                           <p:spTgt spid="5">
                                             <p:txEl>
-                                              <p:pRg st="3" end="3"/>
+                                              <p:pRg st="2" end="2"/>
                                             </p:txEl>
                                           </p:spTgt>
                                         </p:tgtEl>
@@ -7080,7 +7250,7 @@
                                         <p:tgtEl>
                                           <p:spTgt spid="5">
                                             <p:txEl>
-                                              <p:pRg st="4" end="4"/>
+                                              <p:pRg st="3" end="3"/>
                                             </p:txEl>
                                           </p:spTgt>
                                         </p:tgtEl>
@@ -7098,7 +7268,7 @@
                                         <p:tgtEl>
                                           <p:spTgt spid="5">
                                             <p:txEl>
-                                              <p:pRg st="4" end="4"/>
+                                              <p:pRg st="3" end="3"/>
                                             </p:txEl>
                                           </p:spTgt>
                                         </p:tgtEl>
@@ -7141,7 +7311,7 @@
                                         <p:tgtEl>
                                           <p:spTgt spid="5">
                                             <p:txEl>
-                                              <p:pRg st="5" end="5"/>
+                                              <p:pRg st="4" end="4"/>
                                             </p:txEl>
                                           </p:spTgt>
                                         </p:tgtEl>
@@ -7159,7 +7329,7 @@
                                         <p:tgtEl>
                                           <p:spTgt spid="5">
                                             <p:txEl>
-                                              <p:pRg st="5" end="5"/>
+                                              <p:pRg st="4" end="4"/>
                                             </p:txEl>
                                           </p:spTgt>
                                         </p:tgtEl>
@@ -14746,44 +14916,204 @@
               <a:t> </a:t>
             </a:r>
             <a:r>
-              <a:rPr lang="en-US" sz="2400" dirty="0">
-                <a:latin typeface="Cambria" panose="02040503050406030204" pitchFamily="18" charset="0"/>
-              </a:rPr>
-              <a:t>Requests and reservations can be cancelled if and only if no taxi have been assigned to the customer. </a:t>
-            </a:r>
-            <a:endParaRPr lang="en-US" sz="2400" dirty="0" smtClean="0">
+              <a:rPr lang="en-US" sz="1900" b="1" dirty="0">
+                <a:latin typeface="Cambria" panose="02040503050406030204" pitchFamily="18" charset="0"/>
+              </a:rPr>
+              <a:t>Requests</a:t>
+            </a:r>
+            <a:r>
+              <a:rPr lang="en-US" sz="1900" dirty="0">
+                <a:latin typeface="Cambria" panose="02040503050406030204" pitchFamily="18" charset="0"/>
+              </a:rPr>
+              <a:t> and </a:t>
+            </a:r>
+            <a:r>
+              <a:rPr lang="en-US" sz="1900" b="1" dirty="0">
+                <a:latin typeface="Cambria" panose="02040503050406030204" pitchFamily="18" charset="0"/>
+              </a:rPr>
+              <a:t>reservations</a:t>
+            </a:r>
+            <a:r>
+              <a:rPr lang="en-US" sz="1900" dirty="0">
+                <a:latin typeface="Cambria" panose="02040503050406030204" pitchFamily="18" charset="0"/>
+              </a:rPr>
+              <a:t> can be </a:t>
+            </a:r>
+            <a:r>
+              <a:rPr lang="en-US" sz="1900" b="1" dirty="0">
+                <a:latin typeface="Cambria" panose="02040503050406030204" pitchFamily="18" charset="0"/>
+              </a:rPr>
+              <a:t>cancelled</a:t>
+            </a:r>
+            <a:r>
+              <a:rPr lang="en-US" sz="1900" dirty="0">
+                <a:latin typeface="Cambria" panose="02040503050406030204" pitchFamily="18" charset="0"/>
+              </a:rPr>
+              <a:t> if and only if no taxi have been </a:t>
+            </a:r>
+            <a:r>
+              <a:rPr lang="en-US" sz="1900" b="1" dirty="0">
+                <a:latin typeface="Cambria" panose="02040503050406030204" pitchFamily="18" charset="0"/>
+              </a:rPr>
+              <a:t>assigned</a:t>
+            </a:r>
+            <a:r>
+              <a:rPr lang="en-US" sz="1900" dirty="0">
+                <a:latin typeface="Cambria" panose="02040503050406030204" pitchFamily="18" charset="0"/>
+              </a:rPr>
+              <a:t> to the customer. </a:t>
+            </a:r>
+            <a:endParaRPr lang="en-US" sz="1900" dirty="0" smtClean="0">
               <a:latin typeface="Cambria" panose="02040503050406030204" pitchFamily="18" charset="0"/>
             </a:endParaRPr>
           </a:p>
           <a:p>
-            <a:endParaRPr lang="en-US" sz="2400" dirty="0">
+            <a:endParaRPr lang="en-US" sz="1900" dirty="0">
               <a:latin typeface="Cambria" panose="02040503050406030204" pitchFamily="18" charset="0"/>
             </a:endParaRPr>
           </a:p>
           <a:p>
             <a:r>
-              <a:rPr lang="en-US" sz="2400" dirty="0" smtClean="0">
-                <a:latin typeface="Cambria" panose="02040503050406030204" pitchFamily="18" charset="0"/>
-              </a:rPr>
-              <a:t> Customers are not allowed to request a taxi ride if any other request made by the same account has not been fulfilled yet.</a:t>
-            </a:r>
+              <a:rPr lang="en-US" sz="1900" dirty="0" smtClean="0">
+                <a:latin typeface="Cambria" panose="02040503050406030204" pitchFamily="18" charset="0"/>
+              </a:rPr>
+              <a:t> Customers </a:t>
+            </a:r>
+            <a:r>
+              <a:rPr lang="en-US" sz="1900" dirty="0" smtClean="0">
+                <a:latin typeface="Cambria" panose="02040503050406030204" pitchFamily="18" charset="0"/>
+              </a:rPr>
+              <a:t>are not allowed make more than </a:t>
+            </a:r>
+            <a:r>
+              <a:rPr lang="en-US" sz="1900" b="1" dirty="0" smtClean="0">
+                <a:latin typeface="Cambria" panose="02040503050406030204" pitchFamily="18" charset="0"/>
+              </a:rPr>
+              <a:t>one request </a:t>
+            </a:r>
+            <a:r>
+              <a:rPr lang="en-US" sz="1900" dirty="0" smtClean="0">
+                <a:latin typeface="Cambria" panose="02040503050406030204" pitchFamily="18" charset="0"/>
+              </a:rPr>
+              <a:t>if the previous has not been fulfilled yet.</a:t>
+            </a:r>
+            <a:endParaRPr lang="en-US" sz="1900" dirty="0" smtClean="0">
+              <a:latin typeface="Cambria" panose="02040503050406030204" pitchFamily="18" charset="0"/>
+            </a:endParaRPr>
           </a:p>
           <a:p>
             <a:pPr marL="0" indent="0">
               <a:buNone/>
             </a:pPr>
-            <a:endParaRPr lang="en-US" sz="2400" dirty="0" smtClean="0">
+            <a:endParaRPr lang="en-US" sz="1900" dirty="0" smtClean="0">
               <a:latin typeface="Cambria" panose="02040503050406030204" pitchFamily="18" charset="0"/>
             </a:endParaRPr>
           </a:p>
           <a:p>
             <a:r>
-              <a:rPr lang="en-US" sz="2400" dirty="0" smtClean="0">
-                <a:latin typeface="Cambria" panose="02040503050406030204" pitchFamily="18" charset="0"/>
-              </a:rPr>
-              <a:t> Customers are allowed to perform unlimited taxi reservations. However, due to the fact that overlaps between two reservations are not predictable, the system will cancel any impracticable reservation identified at runtime. </a:t>
-            </a:r>
-            <a:endParaRPr lang="it-IT" sz="2400" dirty="0" smtClean="0">
+              <a:rPr lang="en-US" sz="1900" dirty="0" smtClean="0">
+                <a:latin typeface="Cambria" panose="02040503050406030204" pitchFamily="18" charset="0"/>
+              </a:rPr>
+              <a:t> </a:t>
+            </a:r>
+            <a:r>
+              <a:rPr lang="en-US" sz="1900" b="1" dirty="0" smtClean="0">
+                <a:latin typeface="Cambria" panose="02040503050406030204" pitchFamily="18" charset="0"/>
+              </a:rPr>
+              <a:t>Unlimited</a:t>
+            </a:r>
+            <a:r>
+              <a:rPr lang="en-US" sz="1900" dirty="0" smtClean="0">
+                <a:latin typeface="Cambria" panose="02040503050406030204" pitchFamily="18" charset="0"/>
+              </a:rPr>
+              <a:t> taxi reservations can be performed.                                             However, impracticable reservations </a:t>
+            </a:r>
+            <a:r>
+              <a:rPr lang="en-US" sz="1900" dirty="0" smtClean="0">
+                <a:latin typeface="Cambria" panose="02040503050406030204" pitchFamily="18" charset="0"/>
+              </a:rPr>
+              <a:t>identified at </a:t>
+            </a:r>
+            <a:r>
+              <a:rPr lang="en-US" sz="1900" dirty="0" smtClean="0">
+                <a:latin typeface="Cambria" panose="02040503050406030204" pitchFamily="18" charset="0"/>
+              </a:rPr>
+              <a:t>runtime will be </a:t>
+            </a:r>
+            <a:r>
+              <a:rPr lang="en-US" sz="1900" b="1" dirty="0" smtClean="0">
+                <a:latin typeface="Cambria" panose="02040503050406030204" pitchFamily="18" charset="0"/>
+              </a:rPr>
+              <a:t>cancelled.</a:t>
+            </a:r>
+          </a:p>
+          <a:p>
+            <a:endParaRPr lang="en-US" sz="1900" b="1" dirty="0" smtClean="0">
+              <a:latin typeface="Cambria" panose="02040503050406030204" pitchFamily="18" charset="0"/>
+            </a:endParaRPr>
+          </a:p>
+          <a:p>
+            <a:r>
+              <a:rPr lang="en-US" sz="1900" dirty="0">
+                <a:latin typeface="Cambria" panose="02040503050406030204" pitchFamily="18" charset="0"/>
+              </a:rPr>
+              <a:t>T</a:t>
+            </a:r>
+            <a:r>
+              <a:rPr lang="en-US" sz="1900" dirty="0" smtClean="0">
+                <a:latin typeface="Cambria" panose="02040503050406030204" pitchFamily="18" charset="0"/>
+              </a:rPr>
+              <a:t>he </a:t>
+            </a:r>
+            <a:r>
+              <a:rPr lang="en-US" sz="1900" dirty="0">
+                <a:latin typeface="Cambria" panose="02040503050406030204" pitchFamily="18" charset="0"/>
+              </a:rPr>
+              <a:t>taxi company has a </a:t>
+            </a:r>
+            <a:r>
+              <a:rPr lang="en-US" sz="1900" b="1" dirty="0">
+                <a:latin typeface="Cambria" panose="02040503050406030204" pitchFamily="18" charset="0"/>
+              </a:rPr>
+              <a:t>call center </a:t>
+            </a:r>
+            <a:r>
+              <a:rPr lang="en-US" sz="1900" dirty="0">
+                <a:latin typeface="Cambria" panose="02040503050406030204" pitchFamily="18" charset="0"/>
+              </a:rPr>
+              <a:t>that customer and taxi drivers can contact to </a:t>
+            </a:r>
+            <a:r>
+              <a:rPr lang="en-US" sz="1900" b="1" dirty="0">
+                <a:latin typeface="Cambria" panose="02040503050406030204" pitchFamily="18" charset="0"/>
+              </a:rPr>
+              <a:t>report</a:t>
+            </a:r>
+            <a:r>
+              <a:rPr lang="en-US" sz="1900" dirty="0">
+                <a:latin typeface="Cambria" panose="02040503050406030204" pitchFamily="18" charset="0"/>
+              </a:rPr>
+              <a:t> </a:t>
+            </a:r>
+            <a:r>
+              <a:rPr lang="en-US" sz="1900" b="1" dirty="0">
+                <a:latin typeface="Cambria" panose="02040503050406030204" pitchFamily="18" charset="0"/>
+              </a:rPr>
+              <a:t>issues</a:t>
+            </a:r>
+            <a:r>
+              <a:rPr lang="en-US" sz="1900" dirty="0">
+                <a:latin typeface="Cambria" panose="02040503050406030204" pitchFamily="18" charset="0"/>
+              </a:rPr>
+              <a:t> that cannot be resolved </a:t>
+            </a:r>
+            <a:r>
+              <a:rPr lang="en-US" sz="1900" dirty="0" smtClean="0">
+                <a:latin typeface="Cambria" panose="02040503050406030204" pitchFamily="18" charset="0"/>
+              </a:rPr>
+              <a:t>otherwise.</a:t>
+            </a:r>
+            <a:endParaRPr lang="it-IT" sz="1900" dirty="0">
               <a:latin typeface="Cambria" panose="02040503050406030204" pitchFamily="18" charset="0"/>
             </a:endParaRPr>
           </a:p>
@@ -14989,6 +15319,67 @@
                                           <p:spTgt spid="6">
                                             <p:txEl>
                                               <p:pRg st="4" end="4"/>
+                                            </p:txEl>
+                                          </p:spTgt>
+                                        </p:tgtEl>
+                                      </p:cBhvr>
+                                    </p:animEffect>
+                                  </p:childTnLst>
+                                </p:cTn>
+                              </p:par>
+                            </p:childTnLst>
+                          </p:cTn>
+                        </p:par>
+                      </p:childTnLst>
+                    </p:cTn>
+                  </p:par>
+                  <p:par>
+                    <p:cTn id="18" fill="hold">
+                      <p:stCondLst>
+                        <p:cond delay="indefinite"/>
+                      </p:stCondLst>
+                      <p:childTnLst>
+                        <p:par>
+                          <p:cTn id="19" fill="hold">
+                            <p:stCondLst>
+                              <p:cond delay="0"/>
+                            </p:stCondLst>
+                            <p:childTnLst>
+                              <p:par>
+                                <p:cTn id="20" presetID="10" presetClass="entr" presetSubtype="0" fill="hold" nodeType="clickEffect">
+                                  <p:stCondLst>
+                                    <p:cond delay="0"/>
+                                  </p:stCondLst>
+                                  <p:childTnLst>
+                                    <p:set>
+                                      <p:cBhvr>
+                                        <p:cTn id="21" dur="1" fill="hold">
+                                          <p:stCondLst>
+                                            <p:cond delay="0"/>
+                                          </p:stCondLst>
+                                        </p:cTn>
+                                        <p:tgtEl>
+                                          <p:spTgt spid="6">
+                                            <p:txEl>
+                                              <p:pRg st="6" end="6"/>
+                                            </p:txEl>
+                                          </p:spTgt>
+                                        </p:tgtEl>
+                                        <p:attrNameLst>
+                                          <p:attrName>style.visibility</p:attrName>
+                                        </p:attrNameLst>
+                                      </p:cBhvr>
+                                      <p:to>
+                                        <p:strVal val="visible"/>
+                                      </p:to>
+                                    </p:set>
+                                    <p:animEffect transition="in" filter="fade">
+                                      <p:cBhvr>
+                                        <p:cTn id="22" dur="500"/>
+                                        <p:tgtEl>
+                                          <p:spTgt spid="6">
+                                            <p:txEl>
+                                              <p:pRg st="6" end="6"/>
                                             </p:txEl>
                                           </p:spTgt>
                                         </p:tgtEl>
@@ -20934,7 +21325,12 @@
             <p:ph idx="1"/>
           </p:nvPr>
         </p:nvSpPr>
-        <p:spPr/>
+        <p:spPr>
+          <a:xfrm>
+            <a:off x="457200" y="1200150"/>
+            <a:ext cx="8229600" cy="3459831"/>
+          </a:xfrm>
+        </p:spPr>
         <p:txBody>
           <a:bodyPr>
             <a:normAutofit fontScale="55000" lnSpcReduction="20000"/>
@@ -20942,71 +21338,221 @@
           <a:lstStyle/>
           <a:p>
             <a:r>
-              <a:rPr lang="en-US" dirty="0" smtClean="0"/>
-              <a:t> </a:t>
-            </a:r>
-            <a:r>
-              <a:rPr lang="en-US" dirty="0">
-                <a:latin typeface="Cambria" panose="02040503050406030204" pitchFamily="18" charset="0"/>
-              </a:rPr>
-              <a:t>Taxi drivers will manually update their status (available or busy) with the mobile app every time they pick up or drop off standard customers. On the contrary, when drivers accept a ride request by MTS customers, the “busy” </a:t>
-            </a:r>
-            <a:r>
               <a:rPr lang="en-US" dirty="0" smtClean="0">
                 <a:latin typeface="Cambria" panose="02040503050406030204" pitchFamily="18" charset="0"/>
               </a:rPr>
-              <a:t>status </a:t>
-            </a:r>
-            <a:r>
-              <a:rPr lang="en-US" dirty="0">
-                <a:latin typeface="Cambria" panose="02040503050406030204" pitchFamily="18" charset="0"/>
-              </a:rPr>
-              <a:t>will be automatically set up by the system. Anyway, the “available” status must still be selected manually after the customer has been taken to destination. </a:t>
-            </a:r>
+              <a:t>Taxi drivers’ </a:t>
+            </a:r>
+            <a:r>
+              <a:rPr lang="en-US" b="1" dirty="0" smtClean="0">
+                <a:latin typeface="Cambria" panose="02040503050406030204" pitchFamily="18" charset="0"/>
+              </a:rPr>
+              <a:t>status</a:t>
+            </a:r>
+            <a:r>
+              <a:rPr lang="en-US" dirty="0" smtClean="0">
+                <a:latin typeface="Cambria" panose="02040503050406030204" pitchFamily="18" charset="0"/>
+              </a:rPr>
+              <a:t> must be updated </a:t>
+            </a:r>
+            <a:r>
+              <a:rPr lang="en-US" b="1" dirty="0" smtClean="0">
+                <a:latin typeface="Cambria" panose="02040503050406030204" pitchFamily="18" charset="0"/>
+              </a:rPr>
+              <a:t>manually</a:t>
+            </a:r>
+            <a:r>
+              <a:rPr lang="en-US" dirty="0" smtClean="0">
+                <a:latin typeface="Cambria" panose="02040503050406030204" pitchFamily="18" charset="0"/>
+              </a:rPr>
+              <a:t>, except when the driver accept a ride request by a MTS customer.</a:t>
+            </a:r>
+          </a:p>
+          <a:p>
             <a:endParaRPr lang="en-US" dirty="0" smtClean="0">
               <a:latin typeface="Cambria" panose="02040503050406030204" pitchFamily="18" charset="0"/>
             </a:endParaRPr>
           </a:p>
           <a:p>
+            <a:r>
+              <a:rPr lang="en-US" dirty="0" smtClean="0">
+                <a:latin typeface="Cambria" panose="02040503050406030204" pitchFamily="18" charset="0"/>
+              </a:rPr>
+              <a:t> </a:t>
+            </a:r>
+            <a:r>
+              <a:rPr lang="en-US" b="1" dirty="0" smtClean="0">
+                <a:latin typeface="Cambria" panose="02040503050406030204" pitchFamily="18" charset="0"/>
+              </a:rPr>
+              <a:t>Payment</a:t>
+            </a:r>
+            <a:r>
+              <a:rPr lang="en-US" dirty="0" smtClean="0">
+                <a:latin typeface="Cambria" panose="02040503050406030204" pitchFamily="18" charset="0"/>
+              </a:rPr>
+              <a:t> and </a:t>
+            </a:r>
+            <a:r>
+              <a:rPr lang="en-US" b="1" dirty="0" smtClean="0">
+                <a:latin typeface="Cambria" panose="02040503050406030204" pitchFamily="18" charset="0"/>
+              </a:rPr>
+              <a:t>specific duties </a:t>
+            </a:r>
+            <a:r>
+              <a:rPr lang="en-US" dirty="0" smtClean="0">
+                <a:latin typeface="Cambria" panose="02040503050406030204" pitchFamily="18" charset="0"/>
+              </a:rPr>
+              <a:t>related to the taxi service are </a:t>
+            </a:r>
+            <a:r>
+              <a:rPr lang="en-US" b="1" dirty="0" smtClean="0">
+                <a:latin typeface="Cambria" panose="02040503050406030204" pitchFamily="18" charset="0"/>
+              </a:rPr>
+              <a:t>not</a:t>
+            </a:r>
+            <a:r>
+              <a:rPr lang="en-US" dirty="0" smtClean="0">
+                <a:latin typeface="Cambria" panose="02040503050406030204" pitchFamily="18" charset="0"/>
+              </a:rPr>
+              <a:t> </a:t>
+            </a:r>
+            <a:r>
+              <a:rPr lang="en-US" b="1" dirty="0" smtClean="0">
+                <a:latin typeface="Cambria" panose="02040503050406030204" pitchFamily="18" charset="0"/>
+              </a:rPr>
+              <a:t>considered</a:t>
+            </a:r>
+            <a:r>
+              <a:rPr lang="en-US" dirty="0" smtClean="0">
+                <a:latin typeface="Cambria" panose="02040503050406030204" pitchFamily="18" charset="0"/>
+              </a:rPr>
+              <a:t> and managed by the application. </a:t>
+            </a:r>
+            <a:r>
+              <a:rPr lang="en-US" dirty="0" err="1" smtClean="0">
+                <a:latin typeface="Cambria" panose="02040503050406030204" pitchFamily="18" charset="0"/>
+              </a:rPr>
+              <a:t>MyTaxiService</a:t>
+            </a:r>
+            <a:r>
+              <a:rPr lang="en-US" dirty="0" smtClean="0">
+                <a:latin typeface="Cambria" panose="02040503050406030204" pitchFamily="18" charset="0"/>
+              </a:rPr>
+              <a:t> is meant to be only an interface between customers and taxi drivers.</a:t>
+            </a:r>
+            <a:endParaRPr lang="en-US" dirty="0">
+              <a:latin typeface="Cambria" panose="02040503050406030204" pitchFamily="18" charset="0"/>
+            </a:endParaRPr>
+          </a:p>
+          <a:p>
+            <a:endParaRPr lang="en-US" dirty="0">
+              <a:latin typeface="Cambria" panose="02040503050406030204" pitchFamily="18" charset="0"/>
+            </a:endParaRPr>
+          </a:p>
+          <a:p>
+            <a:r>
+              <a:rPr lang="en-US" dirty="0" smtClean="0">
+                <a:latin typeface="Cambria" panose="02040503050406030204" pitchFamily="18" charset="0"/>
+              </a:rPr>
+              <a:t>  A </a:t>
+            </a:r>
+            <a:r>
+              <a:rPr lang="en-US" b="1" dirty="0" smtClean="0">
+                <a:latin typeface="Cambria" panose="02040503050406030204" pitchFamily="18" charset="0"/>
+              </a:rPr>
+              <a:t>taxi driver account cannot</a:t>
+            </a:r>
+            <a:r>
+              <a:rPr lang="en-US" dirty="0" smtClean="0">
+                <a:latin typeface="Cambria" panose="02040503050406030204" pitchFamily="18" charset="0"/>
+              </a:rPr>
+              <a:t> be used as a </a:t>
+            </a:r>
+            <a:r>
+              <a:rPr lang="en-US" b="1" dirty="0" smtClean="0">
+                <a:latin typeface="Cambria" panose="02040503050406030204" pitchFamily="18" charset="0"/>
+              </a:rPr>
+              <a:t>customer</a:t>
+            </a:r>
+            <a:r>
+              <a:rPr lang="en-US" dirty="0" smtClean="0">
+                <a:latin typeface="Cambria" panose="02040503050406030204" pitchFamily="18" charset="0"/>
+              </a:rPr>
+              <a:t> </a:t>
+            </a:r>
+            <a:r>
+              <a:rPr lang="en-US" b="1" dirty="0" smtClean="0">
+                <a:latin typeface="Cambria" panose="02040503050406030204" pitchFamily="18" charset="0"/>
+              </a:rPr>
+              <a:t>account</a:t>
+            </a:r>
+            <a:r>
+              <a:rPr lang="en-US" dirty="0" smtClean="0">
+                <a:latin typeface="Cambria" panose="02040503050406030204" pitchFamily="18" charset="0"/>
+              </a:rPr>
+              <a:t>, and vice versa. This means that if a taxi driver wants to access the customer’s services, he will need to create a customer account. </a:t>
+            </a:r>
             <a:endParaRPr lang="en-US" dirty="0" smtClean="0">
               <a:latin typeface="Cambria" panose="02040503050406030204" pitchFamily="18" charset="0"/>
             </a:endParaRPr>
           </a:p>
           <a:p>
-            <a:r>
-              <a:rPr lang="en-US" dirty="0" smtClean="0">
-                <a:latin typeface="Cambria" panose="02040503050406030204" pitchFamily="18" charset="0"/>
-              </a:rPr>
-              <a:t> Payment and specific duties related to the taxi service are not considered and managed by the application. </a:t>
-            </a:r>
-            <a:r>
-              <a:rPr lang="en-US" dirty="0" err="1" smtClean="0">
-                <a:latin typeface="Cambria" panose="02040503050406030204" pitchFamily="18" charset="0"/>
-              </a:rPr>
-              <a:t>MyTaxiService</a:t>
-            </a:r>
-            <a:r>
-              <a:rPr lang="en-US" dirty="0" smtClean="0">
-                <a:latin typeface="Cambria" panose="02040503050406030204" pitchFamily="18" charset="0"/>
-              </a:rPr>
-              <a:t> is meant to be only an interface between customers and taxi drivers.</a:t>
-            </a:r>
             <a:endParaRPr lang="en-US" dirty="0">
               <a:latin typeface="Cambria" panose="02040503050406030204" pitchFamily="18" charset="0"/>
             </a:endParaRPr>
           </a:p>
           <a:p>
-            <a:endParaRPr lang="en-US" dirty="0">
+            <a:r>
+              <a:rPr lang="en-US" sz="3300" dirty="0">
+                <a:latin typeface="Cambria" panose="02040503050406030204" pitchFamily="18" charset="0"/>
+              </a:rPr>
+              <a:t>The taxi service company is using a (possibly external) </a:t>
+            </a:r>
+            <a:r>
+              <a:rPr lang="en-US" sz="3300" b="1" dirty="0">
+                <a:latin typeface="Cambria" panose="02040503050406030204" pitchFamily="18" charset="0"/>
+              </a:rPr>
+              <a:t>email service</a:t>
+            </a:r>
+            <a:r>
+              <a:rPr lang="en-US" sz="3300" dirty="0">
+                <a:latin typeface="Cambria" panose="02040503050406030204" pitchFamily="18" charset="0"/>
+              </a:rPr>
+              <a:t>, which can provide </a:t>
+            </a:r>
+            <a:r>
+              <a:rPr lang="en-US" sz="3300" b="1" dirty="0">
+                <a:latin typeface="Cambria" panose="02040503050406030204" pitchFamily="18" charset="0"/>
+              </a:rPr>
+              <a:t>email accounts </a:t>
+            </a:r>
+            <a:r>
+              <a:rPr lang="en-US" sz="3300" dirty="0">
+                <a:latin typeface="Cambria" panose="02040503050406030204" pitchFamily="18" charset="0"/>
+              </a:rPr>
+              <a:t>to be given to taxi drivers </a:t>
+            </a:r>
+            <a:r>
+              <a:rPr lang="en-US" sz="3300" dirty="0" smtClean="0">
+                <a:latin typeface="Cambria" panose="02040503050406030204" pitchFamily="18" charset="0"/>
+              </a:rPr>
+              <a:t>and (eventually) other </a:t>
+            </a:r>
+            <a:r>
+              <a:rPr lang="en-US" sz="3300" dirty="0">
+                <a:latin typeface="Cambria" panose="02040503050406030204" pitchFamily="18" charset="0"/>
+              </a:rPr>
+              <a:t>member of the </a:t>
+            </a:r>
+            <a:r>
+              <a:rPr lang="en-US" sz="3300" dirty="0" smtClean="0">
+                <a:latin typeface="Cambria" panose="02040503050406030204" pitchFamily="18" charset="0"/>
+              </a:rPr>
+              <a:t>company.</a:t>
+            </a:r>
+            <a:endParaRPr lang="en-US" sz="3300" dirty="0">
               <a:latin typeface="Cambria" panose="02040503050406030204" pitchFamily="18" charset="0"/>
             </a:endParaRPr>
-          </a:p>
-          <a:p>
-            <a:r>
-              <a:rPr lang="en-US" dirty="0" smtClean="0">
-                <a:latin typeface="Cambria" panose="02040503050406030204" pitchFamily="18" charset="0"/>
-              </a:rPr>
-              <a:t>  A taxi driver account cannot be used as a customer account, and vice versa. This means that if a taxi driver wants to access the customer’s services, he will need to create a customer account. </a:t>
-            </a:r>
           </a:p>
           <a:p>
             <a:endParaRPr lang="it-IT" dirty="0">
@@ -21202,6 +21748,67 @@
                                           <p:spTgt spid="3">
                                             <p:txEl>
                                               <p:pRg st="4" end="4"/>
+                                            </p:txEl>
+                                          </p:spTgt>
+                                        </p:tgtEl>
+                                      </p:cBhvr>
+                                    </p:animEffect>
+                                  </p:childTnLst>
+                                </p:cTn>
+                              </p:par>
+                            </p:childTnLst>
+                          </p:cTn>
+                        </p:par>
+                      </p:childTnLst>
+                    </p:cTn>
+                  </p:par>
+                  <p:par>
+                    <p:cTn id="18" fill="hold">
+                      <p:stCondLst>
+                        <p:cond delay="indefinite"/>
+                      </p:stCondLst>
+                      <p:childTnLst>
+                        <p:par>
+                          <p:cTn id="19" fill="hold">
+                            <p:stCondLst>
+                              <p:cond delay="0"/>
+                            </p:stCondLst>
+                            <p:childTnLst>
+                              <p:par>
+                                <p:cTn id="20" presetID="10" presetClass="entr" presetSubtype="0" fill="hold" nodeType="clickEffect">
+                                  <p:stCondLst>
+                                    <p:cond delay="0"/>
+                                  </p:stCondLst>
+                                  <p:childTnLst>
+                                    <p:set>
+                                      <p:cBhvr>
+                                        <p:cTn id="21" dur="1" fill="hold">
+                                          <p:stCondLst>
+                                            <p:cond delay="0"/>
+                                          </p:stCondLst>
+                                        </p:cTn>
+                                        <p:tgtEl>
+                                          <p:spTgt spid="3">
+                                            <p:txEl>
+                                              <p:pRg st="6" end="6"/>
+                                            </p:txEl>
+                                          </p:spTgt>
+                                        </p:tgtEl>
+                                        <p:attrNameLst>
+                                          <p:attrName>style.visibility</p:attrName>
+                                        </p:attrNameLst>
+                                      </p:cBhvr>
+                                      <p:to>
+                                        <p:strVal val="visible"/>
+                                      </p:to>
+                                    </p:set>
+                                    <p:animEffect transition="in" filter="fade">
+                                      <p:cBhvr>
+                                        <p:cTn id="22" dur="500"/>
+                                        <p:tgtEl>
+                                          <p:spTgt spid="3">
+                                            <p:txEl>
+                                              <p:pRg st="6" end="6"/>
                                             </p:txEl>
                                           </p:spTgt>
                                         </p:tgtEl>
@@ -22898,67 +23505,314 @@
           </a:p>
           <a:p>
             <a:r>
-              <a:rPr lang="en-US" dirty="0" smtClean="0">
+              <a:rPr lang="en-US" sz="3800" dirty="0" smtClean="0">
                 <a:latin typeface="Cambria" panose="02040503050406030204" pitchFamily="18" charset="0"/>
               </a:rPr>
               <a:t> </a:t>
             </a:r>
             <a:r>
-              <a:rPr lang="en-US" dirty="0">
-                <a:latin typeface="Cambria" panose="02040503050406030204" pitchFamily="18" charset="0"/>
-              </a:rPr>
-              <a:t>If and only if a taxi zone does not have any taxi available to answer a request, the system will search for an available taxi in adjoining zones. Worst case scenario: if there are no taxi available in the adjoined zones, the costumer should be notified and put in hold. During this period of time the costumer should be allowed to cancel the request. </a:t>
-            </a:r>
-            <a:endParaRPr lang="en-US" dirty="0" smtClean="0">
+              <a:rPr lang="en-US" sz="3800" dirty="0">
+                <a:latin typeface="Cambria" panose="02040503050406030204" pitchFamily="18" charset="0"/>
+              </a:rPr>
+              <a:t>If and only if a </a:t>
+            </a:r>
+            <a:r>
+              <a:rPr lang="en-US" sz="3800" b="1" dirty="0">
+                <a:latin typeface="Cambria" panose="02040503050406030204" pitchFamily="18" charset="0"/>
+              </a:rPr>
+              <a:t>taxi zone </a:t>
+            </a:r>
+            <a:r>
+              <a:rPr lang="en-US" sz="3800" dirty="0" smtClean="0">
+                <a:latin typeface="Cambria" panose="02040503050406030204" pitchFamily="18" charset="0"/>
+              </a:rPr>
+              <a:t>there are </a:t>
+            </a:r>
+            <a:r>
+              <a:rPr lang="en-US" sz="3800" b="1" dirty="0" smtClean="0">
+                <a:latin typeface="Cambria" panose="02040503050406030204" pitchFamily="18" charset="0"/>
+              </a:rPr>
+              <a:t>no taxi </a:t>
+            </a:r>
+            <a:r>
+              <a:rPr lang="en-US" sz="3800" b="1" dirty="0">
+                <a:latin typeface="Cambria" panose="02040503050406030204" pitchFamily="18" charset="0"/>
+              </a:rPr>
+              <a:t>available </a:t>
+            </a:r>
+            <a:r>
+              <a:rPr lang="en-US" sz="3800" dirty="0">
+                <a:latin typeface="Cambria" panose="02040503050406030204" pitchFamily="18" charset="0"/>
+              </a:rPr>
+              <a:t>to answer a request, the system will search for an available taxi in </a:t>
+            </a:r>
+            <a:r>
+              <a:rPr lang="en-US" sz="3800" b="1" dirty="0">
+                <a:latin typeface="Cambria" panose="02040503050406030204" pitchFamily="18" charset="0"/>
+              </a:rPr>
+              <a:t>adjoining</a:t>
+            </a:r>
+            <a:r>
+              <a:rPr lang="en-US" sz="3800" dirty="0">
+                <a:latin typeface="Cambria" panose="02040503050406030204" pitchFamily="18" charset="0"/>
+              </a:rPr>
+              <a:t> </a:t>
+            </a:r>
+            <a:r>
+              <a:rPr lang="en-US" sz="3800" b="1" dirty="0">
+                <a:latin typeface="Cambria" panose="02040503050406030204" pitchFamily="18" charset="0"/>
+              </a:rPr>
+              <a:t>zones</a:t>
+            </a:r>
+            <a:r>
+              <a:rPr lang="en-US" sz="3800" dirty="0">
+                <a:latin typeface="Cambria" panose="02040503050406030204" pitchFamily="18" charset="0"/>
+              </a:rPr>
+              <a:t>. </a:t>
+            </a:r>
+            <a:r>
+              <a:rPr lang="en-US" sz="3800" dirty="0" smtClean="0">
+                <a:latin typeface="Cambria" panose="02040503050406030204" pitchFamily="18" charset="0"/>
+              </a:rPr>
+              <a:t>                                                                                             If </a:t>
+            </a:r>
+            <a:r>
+              <a:rPr lang="en-US" sz="3800" dirty="0">
+                <a:latin typeface="Cambria" panose="02040503050406030204" pitchFamily="18" charset="0"/>
+              </a:rPr>
+              <a:t>there are no taxi available in the adjoined zones, the </a:t>
+            </a:r>
+            <a:r>
+              <a:rPr lang="en-US" sz="3800" b="1" dirty="0">
+                <a:latin typeface="Cambria" panose="02040503050406030204" pitchFamily="18" charset="0"/>
+              </a:rPr>
+              <a:t>costumer</a:t>
+            </a:r>
+            <a:r>
+              <a:rPr lang="en-US" sz="3800" dirty="0">
+                <a:latin typeface="Cambria" panose="02040503050406030204" pitchFamily="18" charset="0"/>
+              </a:rPr>
+              <a:t> </a:t>
+            </a:r>
+            <a:r>
+              <a:rPr lang="en-US" sz="3800" dirty="0" smtClean="0">
+                <a:latin typeface="Cambria" panose="02040503050406030204" pitchFamily="18" charset="0"/>
+              </a:rPr>
+              <a:t>will be </a:t>
+            </a:r>
+            <a:r>
+              <a:rPr lang="en-US" sz="3800" b="1" dirty="0">
+                <a:latin typeface="Cambria" panose="02040503050406030204" pitchFamily="18" charset="0"/>
+              </a:rPr>
+              <a:t>notified</a:t>
+            </a:r>
+            <a:r>
+              <a:rPr lang="en-US" sz="3800" dirty="0">
+                <a:latin typeface="Cambria" panose="02040503050406030204" pitchFamily="18" charset="0"/>
+              </a:rPr>
+              <a:t> and put in </a:t>
+            </a:r>
+            <a:r>
+              <a:rPr lang="en-US" sz="3800" b="1" dirty="0">
+                <a:latin typeface="Cambria" panose="02040503050406030204" pitchFamily="18" charset="0"/>
+              </a:rPr>
+              <a:t>hold</a:t>
+            </a:r>
+            <a:r>
+              <a:rPr lang="en-US" sz="3800" dirty="0">
+                <a:latin typeface="Cambria" panose="02040503050406030204" pitchFamily="18" charset="0"/>
+              </a:rPr>
+              <a:t>. </a:t>
+            </a:r>
+            <a:endParaRPr lang="en-US" sz="3800" dirty="0" smtClean="0">
               <a:latin typeface="Cambria" panose="02040503050406030204" pitchFamily="18" charset="0"/>
             </a:endParaRPr>
           </a:p>
           <a:p>
-            <a:pPr marL="0" indent="0">
-              <a:buNone/>
-            </a:pPr>
-            <a:endParaRPr lang="en-US" dirty="0">
+            <a:endParaRPr lang="en-US" sz="3800" dirty="0">
               <a:latin typeface="Cambria" panose="02040503050406030204" pitchFamily="18" charset="0"/>
             </a:endParaRPr>
           </a:p>
           <a:p>
             <a:r>
-              <a:rPr lang="en-US" dirty="0" smtClean="0">
-                <a:latin typeface="Cambria" panose="02040503050406030204" pitchFamily="18" charset="0"/>
-              </a:rPr>
-              <a:t> The web and mobile registration is intended for customers only. Taxi drivers’ account are created by an administrator when they are hired by the taxi company. Taxi drivers will then receive their username and temporary password, which they will be able to change once logged in the application. </a:t>
-            </a:r>
-          </a:p>
-          <a:p>
-            <a:endParaRPr lang="en-US" dirty="0" smtClean="0">
+              <a:rPr lang="en-US" sz="3800" dirty="0" smtClean="0">
+                <a:latin typeface="Cambria" panose="02040503050406030204" pitchFamily="18" charset="0"/>
+              </a:rPr>
+              <a:t>Web </a:t>
+            </a:r>
+            <a:r>
+              <a:rPr lang="en-US" sz="3800" dirty="0" smtClean="0">
+                <a:latin typeface="Cambria" panose="02040503050406030204" pitchFamily="18" charset="0"/>
+              </a:rPr>
+              <a:t>and mobile </a:t>
+            </a:r>
+            <a:r>
+              <a:rPr lang="en-US" sz="3800" b="1" dirty="0" smtClean="0">
+                <a:latin typeface="Cambria" panose="02040503050406030204" pitchFamily="18" charset="0"/>
+              </a:rPr>
+              <a:t>registration</a:t>
+            </a:r>
+            <a:r>
+              <a:rPr lang="en-US" sz="3800" dirty="0" smtClean="0">
+                <a:latin typeface="Cambria" panose="02040503050406030204" pitchFamily="18" charset="0"/>
+              </a:rPr>
+              <a:t> </a:t>
+            </a:r>
+            <a:r>
+              <a:rPr lang="en-US" sz="3800" dirty="0" smtClean="0">
+                <a:latin typeface="Cambria" panose="02040503050406030204" pitchFamily="18" charset="0"/>
+              </a:rPr>
+              <a:t>are</a:t>
+            </a:r>
+            <a:r>
+              <a:rPr lang="en-US" sz="3800" dirty="0" smtClean="0">
+                <a:latin typeface="Cambria" panose="02040503050406030204" pitchFamily="18" charset="0"/>
+              </a:rPr>
+              <a:t> </a:t>
+            </a:r>
+            <a:r>
+              <a:rPr lang="en-US" sz="3800" dirty="0" smtClean="0">
+                <a:latin typeface="Cambria" panose="02040503050406030204" pitchFamily="18" charset="0"/>
+              </a:rPr>
+              <a:t>intended for </a:t>
+            </a:r>
+            <a:r>
+              <a:rPr lang="en-US" sz="3800" b="1" dirty="0" smtClean="0">
+                <a:latin typeface="Cambria" panose="02040503050406030204" pitchFamily="18" charset="0"/>
+              </a:rPr>
+              <a:t>customers</a:t>
+            </a:r>
+            <a:r>
+              <a:rPr lang="en-US" sz="3800" dirty="0" smtClean="0">
+                <a:latin typeface="Cambria" panose="02040503050406030204" pitchFamily="18" charset="0"/>
+              </a:rPr>
+              <a:t> </a:t>
+            </a:r>
+            <a:r>
+              <a:rPr lang="en-US" sz="3800" b="1" dirty="0" smtClean="0">
+                <a:latin typeface="Cambria" panose="02040503050406030204" pitchFamily="18" charset="0"/>
+              </a:rPr>
+              <a:t>only</a:t>
+            </a:r>
+            <a:r>
+              <a:rPr lang="en-US" sz="3800" dirty="0" smtClean="0">
+                <a:latin typeface="Cambria" panose="02040503050406030204" pitchFamily="18" charset="0"/>
+              </a:rPr>
+              <a:t>. </a:t>
+            </a:r>
+            <a:r>
+              <a:rPr lang="en-US" sz="3800" dirty="0" smtClean="0">
+                <a:latin typeface="Cambria" panose="02040503050406030204" pitchFamily="18" charset="0"/>
+              </a:rPr>
+              <a:t>                                                      Taxi </a:t>
+            </a:r>
+            <a:r>
+              <a:rPr lang="en-US" sz="3800" dirty="0" smtClean="0">
+                <a:latin typeface="Cambria" panose="02040503050406030204" pitchFamily="18" charset="0"/>
+              </a:rPr>
+              <a:t>drivers’ account are created by an </a:t>
+            </a:r>
+            <a:r>
+              <a:rPr lang="en-US" sz="3800" b="1" dirty="0" smtClean="0">
+                <a:latin typeface="Cambria" panose="02040503050406030204" pitchFamily="18" charset="0"/>
+              </a:rPr>
+              <a:t>administrator</a:t>
+            </a:r>
+            <a:r>
+              <a:rPr lang="en-US" sz="3800" dirty="0" smtClean="0">
+                <a:latin typeface="Cambria" panose="02040503050406030204" pitchFamily="18" charset="0"/>
+              </a:rPr>
+              <a:t>.</a:t>
+            </a:r>
+            <a:endParaRPr lang="en-US" sz="3800" dirty="0" smtClean="0">
               <a:latin typeface="Cambria" panose="02040503050406030204" pitchFamily="18" charset="0"/>
             </a:endParaRPr>
           </a:p>
           <a:p>
-            <a:r>
-              <a:rPr lang="en-US" dirty="0">
-                <a:latin typeface="Cambria" panose="02040503050406030204" pitchFamily="18" charset="0"/>
-              </a:rPr>
-              <a:t>MTS application won’t deal automatically unexpected behaviors of costumers that are habitually handled by taxi drivers. In detail, if customers leave an inconsistent origin or destination (which has been considered formally correct by the system), like an inexistent house number, drivers will use the </a:t>
-            </a:r>
-            <a:r>
-              <a:rPr lang="en-US" dirty="0" smtClean="0">
-                <a:latin typeface="Cambria" panose="02040503050406030204" pitchFamily="18" charset="0"/>
-              </a:rPr>
-              <a:t>instrument </a:t>
-            </a:r>
-            <a:r>
-              <a:rPr lang="en-US" dirty="0">
-                <a:latin typeface="Cambria" panose="02040503050406030204" pitchFamily="18" charset="0"/>
-              </a:rPr>
-              <a:t>at their disposal (customer’s telephone, assistance number, etc.) to resolve the issue. </a:t>
-            </a:r>
-            <a:endParaRPr lang="en-US" dirty="0" smtClean="0">
+            <a:endParaRPr lang="en-US" sz="3800" dirty="0" smtClean="0">
               <a:latin typeface="Cambria" panose="02040503050406030204" pitchFamily="18" charset="0"/>
             </a:endParaRPr>
           </a:p>
           <a:p>
-            <a:endParaRPr lang="it-IT" dirty="0">
+            <a:r>
+              <a:rPr lang="en-US" sz="3800" b="1" dirty="0" smtClean="0">
+                <a:latin typeface="Cambria" panose="02040503050406030204" pitchFamily="18" charset="0"/>
+              </a:rPr>
+              <a:t>Unexpected</a:t>
+            </a:r>
+            <a:r>
+              <a:rPr lang="en-US" sz="3800" dirty="0" smtClean="0">
+                <a:latin typeface="Cambria" panose="02040503050406030204" pitchFamily="18" charset="0"/>
+              </a:rPr>
+              <a:t> </a:t>
+            </a:r>
+            <a:r>
+              <a:rPr lang="en-US" sz="3800" b="1" dirty="0">
+                <a:latin typeface="Cambria" panose="02040503050406030204" pitchFamily="18" charset="0"/>
+              </a:rPr>
+              <a:t>behaviors</a:t>
+            </a:r>
+            <a:r>
+              <a:rPr lang="en-US" sz="3800" dirty="0">
+                <a:latin typeface="Cambria" panose="02040503050406030204" pitchFamily="18" charset="0"/>
+              </a:rPr>
+              <a:t> of </a:t>
+            </a:r>
+            <a:r>
+              <a:rPr lang="en-US" sz="3800" b="1" dirty="0">
+                <a:latin typeface="Cambria" panose="02040503050406030204" pitchFamily="18" charset="0"/>
+              </a:rPr>
+              <a:t>costumers</a:t>
+            </a:r>
+            <a:r>
+              <a:rPr lang="en-US" sz="3800" dirty="0">
+                <a:latin typeface="Cambria" panose="02040503050406030204" pitchFamily="18" charset="0"/>
+              </a:rPr>
+              <a:t> that are habitually handled by taxi </a:t>
+            </a:r>
+            <a:r>
+              <a:rPr lang="en-US" sz="3800" dirty="0">
+                <a:latin typeface="Cambria" panose="02040503050406030204" pitchFamily="18" charset="0"/>
+              </a:rPr>
+              <a:t>drivers </a:t>
+            </a:r>
+            <a:r>
+              <a:rPr lang="en-US" sz="3800" dirty="0" smtClean="0">
+                <a:latin typeface="Cambria" panose="02040503050406030204" pitchFamily="18" charset="0"/>
+              </a:rPr>
+              <a:t>won’t be handled automatically by MTS.                                                                                                                            Examples: </a:t>
+            </a:r>
+            <a:r>
+              <a:rPr lang="en-US" sz="3800" dirty="0" smtClean="0">
+                <a:latin typeface="Cambria" panose="02040503050406030204" pitchFamily="18" charset="0"/>
+              </a:rPr>
+              <a:t>inconsistent ride origin </a:t>
+            </a:r>
+            <a:r>
+              <a:rPr lang="en-US" sz="3800" dirty="0">
+                <a:latin typeface="Cambria" panose="02040503050406030204" pitchFamily="18" charset="0"/>
+              </a:rPr>
+              <a:t>or </a:t>
+            </a:r>
+            <a:r>
+              <a:rPr lang="en-US" sz="3800" dirty="0" smtClean="0">
+                <a:latin typeface="Cambria" panose="02040503050406030204" pitchFamily="18" charset="0"/>
+              </a:rPr>
+              <a:t>destination, inexistent </a:t>
+            </a:r>
+            <a:r>
+              <a:rPr lang="en-US" sz="3800" dirty="0">
+                <a:latin typeface="Cambria" panose="02040503050406030204" pitchFamily="18" charset="0"/>
+              </a:rPr>
+              <a:t>house number, </a:t>
+            </a:r>
+            <a:r>
+              <a:rPr lang="en-US" sz="3800" dirty="0" smtClean="0">
+                <a:latin typeface="Cambria" panose="02040503050406030204" pitchFamily="18" charset="0"/>
+              </a:rPr>
+              <a:t>etc.</a:t>
+            </a:r>
+            <a:endParaRPr lang="it-IT" sz="3800" dirty="0">
               <a:latin typeface="Cambria" panose="02040503050406030204" pitchFamily="18" charset="0"/>
             </a:endParaRPr>
           </a:p>
@@ -23259,8 +24113,8 @@
         </p:nvSpPr>
         <p:spPr>
           <a:xfrm>
-            <a:off x="1614488" y="2571750"/>
-            <a:ext cx="5915025" cy="2088233"/>
+            <a:off x="1331640" y="2499742"/>
+            <a:ext cx="6552728" cy="2376264"/>
           </a:xfrm>
         </p:spPr>
         <p:txBody>
@@ -23269,44 +24123,124 @@
           </a:bodyPr>
           <a:lstStyle/>
           <a:p>
+            <a:pPr>
+              <a:lnSpc>
+                <a:spcPct val="120000"/>
+              </a:lnSpc>
+              <a:spcAft>
+                <a:spcPts val="400"/>
+              </a:spcAft>
+            </a:pPr>
             <a:r>
               <a:rPr lang="en-US" sz="2700" dirty="0">
                 <a:latin typeface="Cambria" panose="02040503050406030204" pitchFamily="18" charset="0"/>
               </a:rPr>
-              <a:t>[R1] Customers should be able to access the service through both the web and the mobile application, even at the same time. </a:t>
+              <a:t>[</a:t>
+            </a:r>
+            <a:r>
+              <a:rPr lang="en-US" sz="2700" b="1" dirty="0">
+                <a:latin typeface="Cambria" panose="02040503050406030204" pitchFamily="18" charset="0"/>
+              </a:rPr>
+              <a:t>R1</a:t>
+            </a:r>
+            <a:r>
+              <a:rPr lang="en-US" sz="2700" dirty="0">
+                <a:latin typeface="Cambria" panose="02040503050406030204" pitchFamily="18" charset="0"/>
+              </a:rPr>
+              <a:t>] Customers should be able to access the service through both the web and the mobile application, even at the same time. </a:t>
             </a:r>
             <a:endParaRPr lang="it-IT" sz="2700" dirty="0">
               <a:latin typeface="Cambria" panose="02040503050406030204" pitchFamily="18" charset="0"/>
             </a:endParaRPr>
           </a:p>
           <a:p>
+            <a:pPr>
+              <a:lnSpc>
+                <a:spcPct val="120000"/>
+              </a:lnSpc>
+              <a:spcAft>
+                <a:spcPts val="400"/>
+              </a:spcAft>
+            </a:pPr>
             <a:r>
               <a:rPr lang="en-US" sz="2700" dirty="0">
                 <a:latin typeface="Cambria" panose="02040503050406030204" pitchFamily="18" charset="0"/>
               </a:rPr>
-              <a:t>[R2] Customers must be able to register to the taxi service from the mobile or web homepage.</a:t>
+              <a:t>[</a:t>
+            </a:r>
+            <a:r>
+              <a:rPr lang="en-US" sz="2700" b="1" dirty="0">
+                <a:latin typeface="Cambria" panose="02040503050406030204" pitchFamily="18" charset="0"/>
+              </a:rPr>
+              <a:t>R2</a:t>
+            </a:r>
+            <a:r>
+              <a:rPr lang="en-US" sz="2700" dirty="0">
+                <a:latin typeface="Cambria" panose="02040503050406030204" pitchFamily="18" charset="0"/>
+              </a:rPr>
+              <a:t>] Customers must be able to register to the taxi service from the mobile or web homepage.</a:t>
             </a:r>
             <a:endParaRPr lang="it-IT" sz="2700" dirty="0">
               <a:latin typeface="Cambria" panose="02040503050406030204" pitchFamily="18" charset="0"/>
             </a:endParaRPr>
           </a:p>
           <a:p>
+            <a:pPr>
+              <a:lnSpc>
+                <a:spcPct val="120000"/>
+              </a:lnSpc>
+              <a:spcAft>
+                <a:spcPts val="400"/>
+              </a:spcAft>
+            </a:pPr>
             <a:r>
               <a:rPr lang="en-US" sz="2700" dirty="0">
                 <a:latin typeface="Cambria" panose="02040503050406030204" pitchFamily="18" charset="0"/>
               </a:rPr>
-              <a:t>[R3] Only registered customers can access MTS’s services.</a:t>
+              <a:t>[</a:t>
+            </a:r>
+            <a:r>
+              <a:rPr lang="en-US" sz="2700" b="1" dirty="0">
+                <a:latin typeface="Cambria" panose="02040503050406030204" pitchFamily="18" charset="0"/>
+              </a:rPr>
+              <a:t>R3</a:t>
+            </a:r>
+            <a:r>
+              <a:rPr lang="en-US" sz="2700" dirty="0">
+                <a:latin typeface="Cambria" panose="02040503050406030204" pitchFamily="18" charset="0"/>
+              </a:rPr>
+              <a:t>] Only registered customers can access MTS’s services.</a:t>
             </a:r>
             <a:endParaRPr lang="it-IT" sz="2700" dirty="0">
               <a:latin typeface="Cambria" panose="02040503050406030204" pitchFamily="18" charset="0"/>
             </a:endParaRPr>
           </a:p>
           <a:p>
+            <a:pPr>
+              <a:lnSpc>
+                <a:spcPct val="120000"/>
+              </a:lnSpc>
+              <a:spcAft>
+                <a:spcPts val="400"/>
+              </a:spcAft>
+            </a:pPr>
             <a:r>
               <a:rPr lang="en-US" sz="2700" dirty="0">
                 <a:latin typeface="Cambria" panose="02040503050406030204" pitchFamily="18" charset="0"/>
               </a:rPr>
-              <a:t>[R4] The system should allow the log out functionality. </a:t>
+              <a:t>[</a:t>
+            </a:r>
+            <a:r>
+              <a:rPr lang="en-US" sz="2700" b="1" dirty="0">
+                <a:latin typeface="Cambria" panose="02040503050406030204" pitchFamily="18" charset="0"/>
+              </a:rPr>
+              <a:t>R4</a:t>
+            </a:r>
+            <a:r>
+              <a:rPr lang="en-US" sz="2700" dirty="0">
+                <a:latin typeface="Cambria" panose="02040503050406030204" pitchFamily="18" charset="0"/>
+              </a:rPr>
+              <a:t>] The system should allow the log out functionality. </a:t>
             </a:r>
           </a:p>
           <a:p>
@@ -23743,8 +24677,8 @@
         </p:nvSpPr>
         <p:spPr>
           <a:xfrm>
-            <a:off x="1635920" y="2355726"/>
-            <a:ext cx="5915025" cy="2245461"/>
+            <a:off x="1115616" y="2355726"/>
+            <a:ext cx="6912768" cy="2448272"/>
           </a:xfrm>
         </p:spPr>
         <p:txBody>
@@ -23753,35 +24687,95 @@
           </a:bodyPr>
           <a:lstStyle/>
           <a:p>
-            <a:r>
-              <a:rPr lang="en-US" dirty="0">
-                <a:latin typeface="Cambria" panose="02040503050406030204" pitchFamily="18" charset="0"/>
-              </a:rPr>
-              <a:t>[R1] Only registered customers can request a taxi ride.</a:t>
-            </a:r>
-            <a:endParaRPr lang="it-IT" dirty="0">
+            <a:pPr>
+              <a:lnSpc>
+                <a:spcPct val="120000"/>
+              </a:lnSpc>
+              <a:spcAft>
+                <a:spcPts val="200"/>
+              </a:spcAft>
+            </a:pPr>
+            <a:r>
+              <a:rPr lang="en-US" sz="2900" dirty="0">
+                <a:latin typeface="Cambria" panose="02040503050406030204" pitchFamily="18" charset="0"/>
+              </a:rPr>
+              <a:t>[</a:t>
+            </a:r>
+            <a:r>
+              <a:rPr lang="en-US" sz="2900" b="1" dirty="0">
+                <a:latin typeface="Cambria" panose="02040503050406030204" pitchFamily="18" charset="0"/>
+              </a:rPr>
+              <a:t>R1</a:t>
+            </a:r>
+            <a:r>
+              <a:rPr lang="en-US" sz="2900" dirty="0">
+                <a:latin typeface="Cambria" panose="02040503050406030204" pitchFamily="18" charset="0"/>
+              </a:rPr>
+              <a:t>] Only registered customers can request a taxi ride.</a:t>
+            </a:r>
+            <a:endParaRPr lang="it-IT" sz="2900" dirty="0">
               <a:latin typeface="Cambria" panose="02040503050406030204" pitchFamily="18" charset="0"/>
             </a:endParaRPr>
           </a:p>
           <a:p>
-            <a:r>
-              <a:rPr lang="en-US" dirty="0">
-                <a:latin typeface="Cambria" panose="02040503050406030204" pitchFamily="18" charset="0"/>
-              </a:rPr>
-              <a:t>[R2] Customers must insert a valid origin location in order to request a ride.</a:t>
-            </a:r>
-            <a:endParaRPr lang="it-IT" dirty="0">
+            <a:pPr>
+              <a:lnSpc>
+                <a:spcPct val="120000"/>
+              </a:lnSpc>
+              <a:spcAft>
+                <a:spcPts val="200"/>
+              </a:spcAft>
+            </a:pPr>
+            <a:r>
+              <a:rPr lang="en-US" sz="2900" dirty="0">
+                <a:latin typeface="Cambria" panose="02040503050406030204" pitchFamily="18" charset="0"/>
+              </a:rPr>
+              <a:t>[</a:t>
+            </a:r>
+            <a:r>
+              <a:rPr lang="en-US" sz="2900" b="1" dirty="0">
+                <a:latin typeface="Cambria" panose="02040503050406030204" pitchFamily="18" charset="0"/>
+              </a:rPr>
+              <a:t>R2</a:t>
+            </a:r>
+            <a:r>
+              <a:rPr lang="en-US" sz="2900" dirty="0">
+                <a:latin typeface="Cambria" panose="02040503050406030204" pitchFamily="18" charset="0"/>
+              </a:rPr>
+              <a:t>] Customers must insert a valid origin location in order to request a ride.</a:t>
+            </a:r>
+            <a:endParaRPr lang="it-IT" sz="2900" dirty="0">
               <a:latin typeface="Cambria" panose="02040503050406030204" pitchFamily="18" charset="0"/>
             </a:endParaRPr>
           </a:p>
           <a:p>
-            <a:r>
-              <a:rPr lang="en-US" dirty="0">
-                <a:latin typeface="Cambria" panose="02040503050406030204" pitchFamily="18" charset="0"/>
-              </a:rPr>
-              <a:t>[R3] The system will not allow more than a request if the previous one (either request or reservation) has not been accomplished yet.</a:t>
-            </a:r>
-            <a:endParaRPr lang="it-IT" dirty="0">
+            <a:pPr>
+              <a:lnSpc>
+                <a:spcPct val="120000"/>
+              </a:lnSpc>
+              <a:spcAft>
+                <a:spcPts val="200"/>
+              </a:spcAft>
+            </a:pPr>
+            <a:r>
+              <a:rPr lang="en-US" sz="2900" dirty="0">
+                <a:latin typeface="Cambria" panose="02040503050406030204" pitchFamily="18" charset="0"/>
+              </a:rPr>
+              <a:t>[</a:t>
+            </a:r>
+            <a:r>
+              <a:rPr lang="en-US" sz="2900" b="1" dirty="0">
+                <a:latin typeface="Cambria" panose="02040503050406030204" pitchFamily="18" charset="0"/>
+              </a:rPr>
+              <a:t>R3</a:t>
+            </a:r>
+            <a:r>
+              <a:rPr lang="en-US" sz="2900" dirty="0">
+                <a:latin typeface="Cambria" panose="02040503050406030204" pitchFamily="18" charset="0"/>
+              </a:rPr>
+              <a:t>] The system will not allow more than a request if the previous one (either request or reservation) has not been accomplished yet.</a:t>
+            </a:r>
+            <a:endParaRPr lang="it-IT" sz="2900" dirty="0">
               <a:latin typeface="Cambria" panose="02040503050406030204" pitchFamily="18" charset="0"/>
             </a:endParaRPr>
           </a:p>
@@ -24149,8 +25143,8 @@
         </p:nvSpPr>
         <p:spPr>
           <a:xfrm>
-            <a:off x="1622563" y="2283718"/>
-            <a:ext cx="5915025" cy="2673305"/>
+            <a:off x="1043608" y="2355726"/>
+            <a:ext cx="6912767" cy="2601297"/>
           </a:xfrm>
         </p:spPr>
         <p:txBody>
@@ -24159,33 +25153,93 @@
           </a:bodyPr>
           <a:lstStyle/>
           <a:p>
+            <a:pPr>
+              <a:lnSpc>
+                <a:spcPct val="120000"/>
+              </a:lnSpc>
+              <a:spcAft>
+                <a:spcPts val="100"/>
+              </a:spcAft>
+            </a:pPr>
             <a:r>
               <a:rPr lang="en-US" dirty="0">
                 <a:latin typeface="Cambria" panose="02040503050406030204" pitchFamily="18" charset="0"/>
               </a:rPr>
-              <a:t>[R1] The system should allow taxi reservations for a specific path communicated by the customer.</a:t>
+              <a:t>[</a:t>
+            </a:r>
+            <a:r>
+              <a:rPr lang="en-US" b="1" dirty="0">
+                <a:latin typeface="Cambria" panose="02040503050406030204" pitchFamily="18" charset="0"/>
+              </a:rPr>
+              <a:t>R1</a:t>
+            </a:r>
+            <a:r>
+              <a:rPr lang="en-US" dirty="0">
+                <a:latin typeface="Cambria" panose="02040503050406030204" pitchFamily="18" charset="0"/>
+              </a:rPr>
+              <a:t>] The system should allow taxi reservations for a specific path communicated by the customer.</a:t>
             </a:r>
             <a:endParaRPr lang="it-IT" dirty="0">
               <a:latin typeface="Cambria" panose="02040503050406030204" pitchFamily="18" charset="0"/>
             </a:endParaRPr>
           </a:p>
           <a:p>
+            <a:pPr>
+              <a:lnSpc>
+                <a:spcPct val="120000"/>
+              </a:lnSpc>
+              <a:spcAft>
+                <a:spcPts val="100"/>
+              </a:spcAft>
+            </a:pPr>
             <a:r>
               <a:rPr lang="en-US" dirty="0">
                 <a:latin typeface="Cambria" panose="02040503050406030204" pitchFamily="18" charset="0"/>
               </a:rPr>
-              <a:t>[R2] The system must not allow overlaps between reservations (or requests) made by the same customer.</a:t>
+              <a:t>[</a:t>
+            </a:r>
+            <a:r>
+              <a:rPr lang="en-US" b="1" dirty="0">
+                <a:latin typeface="Cambria" panose="02040503050406030204" pitchFamily="18" charset="0"/>
+              </a:rPr>
+              <a:t>R2</a:t>
+            </a:r>
+            <a:r>
+              <a:rPr lang="en-US" dirty="0">
+                <a:latin typeface="Cambria" panose="02040503050406030204" pitchFamily="18" charset="0"/>
+              </a:rPr>
+              <a:t>] The system must not allow overlaps between reservations (or requests) made by the same customer.</a:t>
             </a:r>
             <a:endParaRPr lang="it-IT" dirty="0">
               <a:latin typeface="Cambria" panose="02040503050406030204" pitchFamily="18" charset="0"/>
             </a:endParaRPr>
           </a:p>
           <a:p>
+            <a:pPr>
+              <a:lnSpc>
+                <a:spcPct val="120000"/>
+              </a:lnSpc>
+              <a:spcAft>
+                <a:spcPts val="100"/>
+              </a:spcAft>
+            </a:pPr>
             <a:r>
               <a:rPr lang="en-US" dirty="0" smtClean="0">
                 <a:latin typeface="Cambria" panose="02040503050406030204" pitchFamily="18" charset="0"/>
               </a:rPr>
-              <a:t>[R3] </a:t>
+              <a:t>[</a:t>
+            </a:r>
+            <a:r>
+              <a:rPr lang="en-US" b="1" dirty="0" smtClean="0">
+                <a:latin typeface="Cambria" panose="02040503050406030204" pitchFamily="18" charset="0"/>
+              </a:rPr>
+              <a:t>R3</a:t>
+            </a:r>
+            <a:r>
+              <a:rPr lang="en-US" dirty="0" smtClean="0">
+                <a:latin typeface="Cambria" panose="02040503050406030204" pitchFamily="18" charset="0"/>
+              </a:rPr>
+              <a:t>] </a:t>
             </a:r>
             <a:r>
               <a:rPr lang="en-US" dirty="0">
@@ -24198,6 +25252,14 @@
             </a:endParaRPr>
           </a:p>
           <a:p>
+            <a:pPr>
+              <a:lnSpc>
+                <a:spcPct val="120000"/>
+              </a:lnSpc>
+              <a:spcAft>
+                <a:spcPts val="100"/>
+              </a:spcAft>
+            </a:pPr>
             <a:r>
               <a:rPr lang="en-US" dirty="0">
                 <a:latin typeface="Cambria" panose="02040503050406030204" pitchFamily="18" charset="0"/>
@@ -24205,10 +25267,16 @@
               <a:t>[</a:t>
             </a:r>
             <a:r>
+              <a:rPr lang="en-US" b="1" dirty="0" smtClean="0">
+                <a:latin typeface="Cambria" panose="02040503050406030204" pitchFamily="18" charset="0"/>
+              </a:rPr>
+              <a:t>R4</a:t>
+            </a:r>
+            <a:r>
               <a:rPr lang="en-US" dirty="0" smtClean="0">
                 <a:latin typeface="Cambria" panose="02040503050406030204" pitchFamily="18" charset="0"/>
               </a:rPr>
-              <a:t>R4] </a:t>
+              <a:t>] </a:t>
             </a:r>
             <a:r>
               <a:rPr lang="en-US" dirty="0">
@@ -24221,9 +25289,19 @@
             </a:endParaRPr>
           </a:p>
           <a:p>
+            <a:pPr>
+              <a:lnSpc>
+                <a:spcPct val="120000"/>
+              </a:lnSpc>
+            </a:pPr>
             <a:endParaRPr lang="it-IT" dirty="0"/>
           </a:p>
           <a:p>
+            <a:pPr>
+              <a:lnSpc>
+                <a:spcPct val="120000"/>
+              </a:lnSpc>
+            </a:pPr>
             <a:endParaRPr lang="it-IT" dirty="0"/>
           </a:p>
         </p:txBody>
@@ -24645,8 +25723,8 @@
         </p:nvSpPr>
         <p:spPr>
           <a:xfrm>
-            <a:off x="1614487" y="2283718"/>
-            <a:ext cx="5915025" cy="2358207"/>
+            <a:off x="1115616" y="2355726"/>
+            <a:ext cx="6768751" cy="2286199"/>
           </a:xfrm>
         </p:spPr>
         <p:txBody>
@@ -24655,56 +25733,141 @@
           </a:bodyPr>
           <a:lstStyle/>
           <a:p>
-            <a:r>
-              <a:rPr lang="en-US" dirty="0">
-                <a:latin typeface="Cambria" panose="02040503050406030204" pitchFamily="18" charset="0"/>
-              </a:rPr>
-              <a:t>[R1] Taxi drivers should be able to communicate their current availability state to the system.</a:t>
-            </a:r>
-            <a:endParaRPr lang="it-IT" dirty="0">
+            <a:pPr>
+              <a:lnSpc>
+                <a:spcPct val="120000"/>
+              </a:lnSpc>
+              <a:spcAft>
+                <a:spcPts val="200"/>
+              </a:spcAft>
+            </a:pPr>
+            <a:r>
+              <a:rPr lang="en-US" sz="3400" dirty="0">
+                <a:latin typeface="Cambria" panose="02040503050406030204" pitchFamily="18" charset="0"/>
+              </a:rPr>
+              <a:t>[</a:t>
+            </a:r>
+            <a:r>
+              <a:rPr lang="en-US" sz="3400" b="1" dirty="0">
+                <a:latin typeface="Cambria" panose="02040503050406030204" pitchFamily="18" charset="0"/>
+              </a:rPr>
+              <a:t>R1</a:t>
+            </a:r>
+            <a:r>
+              <a:rPr lang="en-US" sz="3400" dirty="0">
+                <a:latin typeface="Cambria" panose="02040503050406030204" pitchFamily="18" charset="0"/>
+              </a:rPr>
+              <a:t>] Taxi drivers should be able to communicate their current availability state to the system.</a:t>
+            </a:r>
+            <a:endParaRPr lang="it-IT" sz="3400" dirty="0">
               <a:latin typeface="Cambria" panose="02040503050406030204" pitchFamily="18" charset="0"/>
             </a:endParaRPr>
           </a:p>
           <a:p>
-            <a:r>
-              <a:rPr lang="en-US" dirty="0">
-                <a:latin typeface="Cambria" panose="02040503050406030204" pitchFamily="18" charset="0"/>
-              </a:rPr>
-              <a:t>[R2] If available, taxi drivers should be able to receive incoming requests.</a:t>
-            </a:r>
-            <a:endParaRPr lang="it-IT" dirty="0">
+            <a:pPr>
+              <a:lnSpc>
+                <a:spcPct val="120000"/>
+              </a:lnSpc>
+              <a:spcAft>
+                <a:spcPts val="200"/>
+              </a:spcAft>
+            </a:pPr>
+            <a:r>
+              <a:rPr lang="en-US" sz="3400" dirty="0">
+                <a:latin typeface="Cambria" panose="02040503050406030204" pitchFamily="18" charset="0"/>
+              </a:rPr>
+              <a:t>[</a:t>
+            </a:r>
+            <a:r>
+              <a:rPr lang="en-US" sz="3400" b="1" dirty="0">
+                <a:latin typeface="Cambria" panose="02040503050406030204" pitchFamily="18" charset="0"/>
+              </a:rPr>
+              <a:t>R2</a:t>
+            </a:r>
+            <a:r>
+              <a:rPr lang="en-US" sz="3400" dirty="0">
+                <a:latin typeface="Cambria" panose="02040503050406030204" pitchFamily="18" charset="0"/>
+              </a:rPr>
+              <a:t>] If available, taxi drivers should be able to receive incoming requests.</a:t>
+            </a:r>
+            <a:endParaRPr lang="it-IT" sz="3400" dirty="0">
               <a:latin typeface="Cambria" panose="02040503050406030204" pitchFamily="18" charset="0"/>
             </a:endParaRPr>
           </a:p>
           <a:p>
-            <a:r>
-              <a:rPr lang="en-US" dirty="0">
-                <a:latin typeface="Cambria" panose="02040503050406030204" pitchFamily="18" charset="0"/>
-              </a:rPr>
-              <a:t>[R3] After receiving an incoming request, the taxi driver should be able to either confirm or not his intention to take charge of the request.</a:t>
-            </a:r>
-            <a:endParaRPr lang="it-IT" dirty="0">
+            <a:pPr>
+              <a:lnSpc>
+                <a:spcPct val="120000"/>
+              </a:lnSpc>
+              <a:spcAft>
+                <a:spcPts val="200"/>
+              </a:spcAft>
+            </a:pPr>
+            <a:r>
+              <a:rPr lang="en-US" sz="3400" dirty="0">
+                <a:latin typeface="Cambria" panose="02040503050406030204" pitchFamily="18" charset="0"/>
+              </a:rPr>
+              <a:t>[</a:t>
+            </a:r>
+            <a:r>
+              <a:rPr lang="en-US" sz="3400" b="1" dirty="0">
+                <a:latin typeface="Cambria" panose="02040503050406030204" pitchFamily="18" charset="0"/>
+              </a:rPr>
+              <a:t>R3</a:t>
+            </a:r>
+            <a:r>
+              <a:rPr lang="en-US" sz="3400" dirty="0">
+                <a:latin typeface="Cambria" panose="02040503050406030204" pitchFamily="18" charset="0"/>
+              </a:rPr>
+              <a:t>] After receiving an incoming request, the taxi driver should be able to either confirm or not his intention to take charge of the request.</a:t>
+            </a:r>
+            <a:endParaRPr lang="it-IT" sz="3400" dirty="0">
               <a:latin typeface="Cambria" panose="02040503050406030204" pitchFamily="18" charset="0"/>
             </a:endParaRPr>
           </a:p>
           <a:p>
-            <a:r>
-              <a:rPr lang="en-US" dirty="0">
-                <a:latin typeface="Cambria" panose="02040503050406030204" pitchFamily="18" charset="0"/>
-              </a:rPr>
-              <a:t>[R4] Taxi drivers must be able to log in the mobile application with preassigned credential and be identified as drivers</a:t>
-            </a:r>
-            <a:r>
-              <a:rPr lang="en-US" dirty="0" smtClean="0">
+            <a:pPr>
+              <a:lnSpc>
+                <a:spcPct val="120000"/>
+              </a:lnSpc>
+              <a:spcAft>
+                <a:spcPts val="200"/>
+              </a:spcAft>
+            </a:pPr>
+            <a:r>
+              <a:rPr lang="en-US" sz="3400" dirty="0">
+                <a:latin typeface="Cambria" panose="02040503050406030204" pitchFamily="18" charset="0"/>
+              </a:rPr>
+              <a:t>[</a:t>
+            </a:r>
+            <a:r>
+              <a:rPr lang="en-US" sz="3400" b="1" dirty="0">
+                <a:latin typeface="Cambria" panose="02040503050406030204" pitchFamily="18" charset="0"/>
+              </a:rPr>
+              <a:t>R4</a:t>
+            </a:r>
+            <a:r>
+              <a:rPr lang="en-US" sz="3400" dirty="0">
+                <a:latin typeface="Cambria" panose="02040503050406030204" pitchFamily="18" charset="0"/>
+              </a:rPr>
+              <a:t>] Taxi drivers must be able to log in the mobile application with preassigned credential and be identified as drivers</a:t>
+            </a:r>
+            <a:r>
+              <a:rPr lang="en-US" sz="3400" dirty="0" smtClean="0">
                 <a:latin typeface="Cambria" panose="02040503050406030204" pitchFamily="18" charset="0"/>
               </a:rPr>
               <a:t>.</a:t>
             </a:r>
-            <a:endParaRPr lang="it-IT" dirty="0">
+            <a:endParaRPr lang="it-IT" sz="3400" dirty="0">
               <a:latin typeface="Cambria" panose="02040503050406030204" pitchFamily="18" charset="0"/>
             </a:endParaRPr>
           </a:p>
           <a:p>
+            <a:pPr>
+              <a:lnSpc>
+                <a:spcPct val="120000"/>
+              </a:lnSpc>
+            </a:pPr>
             <a:endParaRPr lang="it-IT" dirty="0"/>
           </a:p>
         </p:txBody>

</xml_diff>